<commit_message>
Removed the 'demonstration' overlaid slides from the OSCON PowerPoint presentation
</commit_message>
<xml_diff>
--- a/docs/2010oscon/dbrelay_oscon2010.pptx
+++ b/docs/2010oscon/dbrelay_oscon2010.pptx
@@ -6,7 +6,7 @@
     <p:sldMasterId id="2147483651" r:id="rId2"/>
   </p:sldMasterIdLst>
   <p:notesMasterIdLst>
-    <p:notesMasterId r:id="rId41"/>
+    <p:notesMasterId r:id="rId37"/>
   </p:notesMasterIdLst>
   <p:sldIdLst>
     <p:sldId id="282" r:id="rId3"/>
@@ -29,24 +29,20 @@
     <p:sldId id="307" r:id="rId20"/>
     <p:sldId id="295" r:id="rId21"/>
     <p:sldId id="303" r:id="rId22"/>
-    <p:sldId id="277" r:id="rId23"/>
-    <p:sldId id="289" r:id="rId24"/>
-    <p:sldId id="276" r:id="rId25"/>
-    <p:sldId id="290" r:id="rId26"/>
-    <p:sldId id="287" r:id="rId27"/>
-    <p:sldId id="286" r:id="rId28"/>
-    <p:sldId id="291" r:id="rId29"/>
-    <p:sldId id="308" r:id="rId30"/>
-    <p:sldId id="297" r:id="rId31"/>
-    <p:sldId id="283" r:id="rId32"/>
-    <p:sldId id="284" r:id="rId33"/>
-    <p:sldId id="274" r:id="rId34"/>
-    <p:sldId id="300" r:id="rId35"/>
-    <p:sldId id="285" r:id="rId36"/>
-    <p:sldId id="302" r:id="rId37"/>
-    <p:sldId id="301" r:id="rId38"/>
-    <p:sldId id="299" r:id="rId39"/>
-    <p:sldId id="258" r:id="rId40"/>
+    <p:sldId id="289" r:id="rId23"/>
+    <p:sldId id="290" r:id="rId24"/>
+    <p:sldId id="286" r:id="rId25"/>
+    <p:sldId id="308" r:id="rId26"/>
+    <p:sldId id="297" r:id="rId27"/>
+    <p:sldId id="283" r:id="rId28"/>
+    <p:sldId id="284" r:id="rId29"/>
+    <p:sldId id="274" r:id="rId30"/>
+    <p:sldId id="300" r:id="rId31"/>
+    <p:sldId id="285" r:id="rId32"/>
+    <p:sldId id="302" r:id="rId33"/>
+    <p:sldId id="301" r:id="rId34"/>
+    <p:sldId id="299" r:id="rId35"/>
+    <p:sldId id="258" r:id="rId36"/>
   </p:sldIdLst>
   <p:sldSz cx="9144000" cy="6858000" type="letter"/>
   <p:notesSz cx="6858000" cy="9144000"/>
@@ -932,7 +928,7 @@
             <a:fld id="{35A98E69-71C5-5848-B62B-35066CAC3846}" type="slidenum">
               <a:rPr lang="en-US"/>
               <a:pPr/>
-              <a:t>32</a:t>
+              <a:t>28</a:t>
             </a:fld>
             <a:endParaRPr lang="en-US"/>
           </a:p>
@@ -1020,7 +1016,7 @@
             <a:fld id="{35A98E69-71C5-5848-B62B-35066CAC3846}" type="slidenum">
               <a:rPr lang="en-US"/>
               <a:pPr/>
-              <a:t>33</a:t>
+              <a:t>29</a:t>
             </a:fld>
             <a:endParaRPr lang="en-US"/>
           </a:p>
@@ -1108,7 +1104,7 @@
             <a:fld id="{FECE6C08-C8EE-C749-9A65-68BE2EADB7F2}" type="slidenum">
               <a:rPr lang="en-US"/>
               <a:pPr/>
-              <a:t>38</a:t>
+              <a:t>34</a:t>
             </a:fld>
             <a:endParaRPr lang="en-US"/>
           </a:p>
@@ -6865,7 +6861,7 @@
               </a:stretch>
             </p:blipFill>
           </mc:Choice>
-          <mc:Fallback xmlns:p="http://schemas.openxmlformats.org/presentationml/2006/main" xmlns:mv="urn:schemas-microsoft-com:mac:vml" xmlns:mc="http://schemas.openxmlformats.org/markup-compatibility/2006" xmlns:r="http://schemas.openxmlformats.org/officeDocument/2006/relationships" xmlns:a="http://schemas.openxmlformats.org/drawingml/2006/main" xmlns="">
+          <mc:Fallback xmlns:ma="http://schemas.microsoft.com/office/mac/drawingml/2008/main" xmlns="" xmlns:a="http://schemas.openxmlformats.org/drawingml/2006/main" xmlns:r="http://schemas.openxmlformats.org/officeDocument/2006/relationships" xmlns:mc="http://schemas.openxmlformats.org/markup-compatibility/2006" xmlns:mv="urn:schemas-microsoft-com:mac:vml" xmlns:p="http://schemas.openxmlformats.org/presentationml/2006/main">
             <p:blipFill>
               <a:blip r:embed="rId4"/>
               <a:stretch>
@@ -11496,8 +11492,8 @@
         </p:nvSpPr>
         <p:spPr bwMode="auto">
           <a:xfrm>
-            <a:off x="339328" y="651867"/>
-            <a:ext cx="482203" cy="4453532"/>
+            <a:off x="339328" y="651866"/>
+            <a:ext cx="482203" cy="5023107"/>
           </a:xfrm>
           <a:prstGeom prst="rect">
             <a:avLst/>
@@ -12018,7 +12014,7 @@
               <a:defRPr/>
             </a:pPr>
             <a:r>
-              <a:rPr lang="en-US" sz="1300" kern="0" dirty="0" smtClean="0">
+              <a:rPr lang="en-US" sz="1300" kern="0" dirty="0">
                 <a:solidFill>
                   <a:schemeClr val="tx1">
                     <a:lumMod val="85000"/>
@@ -12033,11 +12029,41 @@
               <a:t>10</a:t>
             </a:r>
           </a:p>
+          <a:p>
+            <a:pPr algn="r" eaLnBrk="0" hangingPunct="0">
+              <a:spcBef>
+                <a:spcPts val="0"/>
+              </a:spcBef>
+              <a:spcAft>
+                <a:spcPts val="0"/>
+              </a:spcAft>
+              <a:buClr>
+                <a:srgbClr val="FF7A24"/>
+              </a:buClr>
+              <a:buSzPct val="100000"/>
+              <a:defRPr/>
+            </a:pPr>
+            <a:r>
+              <a:rPr lang="en-US" sz="1300" kern="0" dirty="0" smtClean="0">
+                <a:solidFill>
+                  <a:schemeClr val="tx1">
+                    <a:lumMod val="85000"/>
+                    <a:lumOff val="15000"/>
+                  </a:schemeClr>
+                </a:solidFill>
+                <a:latin typeface="Inconsolata"/>
+                <a:ea typeface="+mn-ea"/>
+                <a:cs typeface="+mn-cs"/>
+                <a:sym typeface="Arial" charset="0"/>
+              </a:rPr>
+              <a:t>11</a:t>
+            </a:r>
+          </a:p>
         </p:txBody>
       </p:sp>
       <p:sp>
         <p:nvSpPr>
-          <p:cNvPr id="52227" name="Title 9"/>
+          <p:cNvPr id="51203" name="Title 9"/>
           <p:cNvSpPr>
             <a:spLocks noGrp="1"/>
           </p:cNvSpPr>
@@ -12051,17 +12077,17 @@
           <a:lstStyle/>
           <a:p>
             <a:r>
-              <a:rPr lang="en-US" smtClean="0">
+              <a:rPr lang="en-US" dirty="0" smtClean="0">
                 <a:latin typeface="Arial Rounded MT Bold" charset="0"/>
               </a:rPr>
-              <a:t>Python example</a:t>
+              <a:t>JavaScript example</a:t>
             </a:r>
           </a:p>
         </p:txBody>
       </p:sp>
       <p:sp>
         <p:nvSpPr>
-          <p:cNvPr id="52228" name="Content Placeholder 10"/>
+          <p:cNvPr id="51204" name="Content Placeholder 10"/>
           <p:cNvSpPr>
             <a:spLocks noGrp="1"/>
           </p:cNvSpPr>
@@ -12072,11 +12098,13 @@
         <p:spPr>
           <a:xfrm>
             <a:off x="982266" y="651866"/>
-            <a:ext cx="7744271" cy="4453533"/>
+            <a:ext cx="7744271" cy="5023107"/>
           </a:xfrm>
         </p:spPr>
         <p:txBody>
-          <a:bodyPr/>
+          <a:bodyPr>
+            <a:noAutofit/>
+          </a:bodyPr>
           <a:lstStyle/>
           <a:p>
             <a:pPr marL="0" indent="0">
@@ -12101,7 +12129,7 @@
                 </a:solidFill>
                 <a:latin typeface="Inconsolata"/>
               </a:rPr>
-              <a:t>import urllib, urllib2</a:t>
+              <a:t>&lt;!DOCTYPE html PUBLIC "-//W3C//DTD XHTML 1.0 Strict//EN”</a:t>
             </a:r>
           </a:p>
           <a:p>
@@ -12127,7 +12155,7 @@
                 </a:solidFill>
                 <a:latin typeface="Inconsolata"/>
               </a:rPr>
-              <a:t>from pprint import pprint</a:t>
+              <a:t>    "http://www.w3.org/TR/xhtml1/DTD/xhtml1-strict.dtd"&gt;</a:t>
             </a:r>
           </a:p>
           <a:p>
@@ -12176,7 +12204,7 @@
                 </a:solidFill>
                 <a:latin typeface="Inconsolata"/>
               </a:rPr>
-              <a:t>try:</a:t>
+              <a:t>&lt;html xmlns="http://www.w3.org/1999/xhtml" xml:lang="en" lang="en"&gt;</a:t>
             </a:r>
           </a:p>
           <a:p>
@@ -12202,7 +12230,7 @@
                 </a:solidFill>
                 <a:latin typeface="Inconsolata"/>
               </a:rPr>
-              <a:t>    import simplejson as json</a:t>
+              <a:t>  &lt;head&gt;</a:t>
             </a:r>
           </a:p>
           <a:p>
@@ -12228,7 +12256,7 @@
                 </a:solidFill>
                 <a:latin typeface="Inconsolata"/>
               </a:rPr>
-              <a:t>except ImportError:</a:t>
+              <a:t>    &lt;script src="/dbrelay/js/jquery/jquery-1.4.2.min.js" &gt;&lt;/script&gt;</a:t>
             </a:r>
           </a:p>
           <a:p>
@@ -12254,7 +12282,7 @@
                 </a:solidFill>
                 <a:latin typeface="Inconsolata"/>
               </a:rPr>
-              <a:t>    import json</a:t>
+              <a:t>    &lt;script&gt;</a:t>
             </a:r>
           </a:p>
           <a:p>
@@ -12303,7 +12331,7 @@
                 </a:solidFill>
                 <a:latin typeface="Inconsolata"/>
               </a:rPr>
-              <a:t>response = urllib2.urlopen(</a:t>
+              <a:t>     jQuery.post( "/sql", {</a:t>
             </a:r>
           </a:p>
           <a:p>
@@ -12329,7 +12357,7 @@
                 </a:solidFill>
                 <a:latin typeface="Inconsolata"/>
               </a:rPr>
-              <a:t>  url  = "http://dbrelay.net:1433/sql",</a:t>
+              <a:t>        connection_name : "dbrelay@oscon",</a:t>
             </a:r>
           </a:p>
           <a:p>
@@ -12355,7 +12383,7 @@
                 </a:solidFill>
                 <a:latin typeface="Inconsolata"/>
               </a:rPr>
-              <a:t>  data = urllib.urlencode({</a:t>
+              <a:t>        sql_server      : "sqlserver",</a:t>
             </a:r>
           </a:p>
           <a:p>
@@ -12381,7 +12409,7 @@
                 </a:solidFill>
                 <a:latin typeface="Inconsolata"/>
               </a:rPr>
-              <a:t>    'connection_name' : 'dbrelay@oscon',</a:t>
+              <a:t>        sql_user        : "demo",</a:t>
             </a:r>
           </a:p>
           <a:p>
@@ -12407,7 +12435,7 @@
                 </a:solidFill>
                 <a:latin typeface="Inconsolata"/>
               </a:rPr>
-              <a:t>    'sql_server'      : 'sqlserver',</a:t>
+              <a:t>        sql_password    : "demo",</a:t>
             </a:r>
           </a:p>
           <a:p>
@@ -12433,7 +12461,7 @@
                 </a:solidFill>
                 <a:latin typeface="Inconsolata"/>
               </a:rPr>
-              <a:t>    'sql_user'        : 'demo',</a:t>
+              <a:t>        sql             : "select count(*) as employees from HumanResources.vEmployee"</a:t>
             </a:r>
           </a:p>
           <a:p>
@@ -12459,7 +12487,7 @@
                 </a:solidFill>
                 <a:latin typeface="Inconsolata"/>
               </a:rPr>
-              <a:t>    'sql_password'    : 'demo',</a:t>
+              <a:t>      }, function( response ) {</a:t>
             </a:r>
           </a:p>
           <a:p>
@@ -12485,7 +12513,7 @@
                 </a:solidFill>
                 <a:latin typeface="Inconsolata"/>
               </a:rPr>
-              <a:t>'sql'             : 'select count(*) as employees from HumanResources.vEmployee'</a:t>
+              <a:t>        jQuery("body").html(</a:t>
             </a:r>
           </a:p>
           <a:p>
@@ -12511,7 +12539,7 @@
                 </a:solidFill>
                 <a:latin typeface="Inconsolata"/>
               </a:rPr>
-              <a:t>}))</a:t>
+              <a:t>          "&lt;p&gt;" + response.data[0].rows[0].employees + " employees&lt;/p&gt;”</a:t>
             </a:r>
           </a:p>
           <a:p>
@@ -12537,7 +12565,33 @@
                 </a:solidFill>
                 <a:latin typeface="Inconsolata"/>
               </a:rPr>
-              <a:t>parsed = json.load( response )</a:t>
+              <a:t>        );</a:t>
+            </a:r>
+          </a:p>
+          <a:p>
+            <a:pPr marL="0" indent="0">
+              <a:lnSpc>
+                <a:spcPct val="100000"/>
+              </a:lnSpc>
+              <a:spcBef>
+                <a:spcPct val="0"/>
+              </a:spcBef>
+              <a:spcAft>
+                <a:spcPct val="0"/>
+              </a:spcAft>
+              <a:buNone/>
+            </a:pPr>
+            <a:r>
+              <a:rPr lang="en-US" sz="1300" noProof="1" smtClean="0">
+                <a:solidFill>
+                  <a:schemeClr val="tx1">
+                    <a:lumMod val="85000"/>
+                    <a:lumOff val="15000"/>
+                  </a:schemeClr>
+                </a:solidFill>
+                <a:latin typeface="Inconsolata"/>
+              </a:rPr>
+              <a:t>      }, "json" );</a:t>
             </a:r>
           </a:p>
           <a:p>
@@ -12586,7 +12640,85 @@
                 </a:solidFill>
                 <a:latin typeface="Inconsolata"/>
               </a:rPr>
-              <a:t>pprint( parsed )</a:t>
+              <a:t>    &lt;/script&gt;</a:t>
+            </a:r>
+          </a:p>
+          <a:p>
+            <a:pPr marL="0" indent="0">
+              <a:lnSpc>
+                <a:spcPct val="100000"/>
+              </a:lnSpc>
+              <a:spcBef>
+                <a:spcPct val="0"/>
+              </a:spcBef>
+              <a:spcAft>
+                <a:spcPct val="0"/>
+              </a:spcAft>
+              <a:buNone/>
+            </a:pPr>
+            <a:r>
+              <a:rPr lang="en-US" sz="1300" noProof="1" smtClean="0">
+                <a:solidFill>
+                  <a:schemeClr val="tx1">
+                    <a:lumMod val="85000"/>
+                    <a:lumOff val="15000"/>
+                  </a:schemeClr>
+                </a:solidFill>
+                <a:latin typeface="Inconsolata"/>
+              </a:rPr>
+              <a:t>  &lt;/head&gt;</a:t>
+            </a:r>
+          </a:p>
+          <a:p>
+            <a:pPr marL="0" indent="0">
+              <a:lnSpc>
+                <a:spcPct val="100000"/>
+              </a:lnSpc>
+              <a:spcBef>
+                <a:spcPct val="0"/>
+              </a:spcBef>
+              <a:spcAft>
+                <a:spcPct val="0"/>
+              </a:spcAft>
+              <a:buNone/>
+            </a:pPr>
+            <a:r>
+              <a:rPr lang="en-US" sz="1300" noProof="1" smtClean="0">
+                <a:solidFill>
+                  <a:schemeClr val="tx1">
+                    <a:lumMod val="85000"/>
+                    <a:lumOff val="15000"/>
+                  </a:schemeClr>
+                </a:solidFill>
+                <a:latin typeface="Inconsolata"/>
+              </a:rPr>
+              <a:t>  &lt;body&gt;&lt;/body&gt;</a:t>
+            </a:r>
+          </a:p>
+          <a:p>
+            <a:pPr marL="0" indent="0">
+              <a:lnSpc>
+                <a:spcPct val="100000"/>
+              </a:lnSpc>
+              <a:spcBef>
+                <a:spcPct val="0"/>
+              </a:spcBef>
+              <a:spcAft>
+                <a:spcPct val="0"/>
+              </a:spcAft>
+              <a:buNone/>
+            </a:pPr>
+            <a:r>
+              <a:rPr lang="en-US" sz="1300" noProof="1" smtClean="0">
+                <a:solidFill>
+                  <a:schemeClr val="tx1">
+                    <a:lumMod val="85000"/>
+                    <a:lumOff val="15000"/>
+                  </a:schemeClr>
+                </a:solidFill>
+                <a:latin typeface="Inconsolata"/>
+              </a:rPr>
+              <a:t>&lt;/html&gt;</a:t>
             </a:r>
           </a:p>
         </p:txBody>
@@ -12644,1570 +12776,6 @@
         </p:nvSpPr>
         <p:spPr bwMode="auto">
           <a:xfrm>
-            <a:off x="821531" y="4419600"/>
-            <a:ext cx="7905006" cy="321469"/>
-          </a:xfrm>
-          <a:prstGeom prst="rect">
-            <a:avLst/>
-          </a:prstGeom>
-          <a:solidFill>
-            <a:schemeClr val="bg2">
-              <a:lumMod val="40000"/>
-              <a:lumOff val="60000"/>
-              <a:alpha val="60000"/>
-            </a:schemeClr>
-          </a:solidFill>
-          <a:ln w="25400" cap="flat" cmpd="sng" algn="ctr">
-            <a:noFill/>
-            <a:prstDash val="solid"/>
-            <a:round/>
-            <a:headEnd type="none" w="med" len="med"/>
-            <a:tailEnd type="none" w="med" len="med"/>
-          </a:ln>
-          <a:effectLst/>
-        </p:spPr>
-        <p:txBody>
-          <a:bodyPr lIns="64291" tIns="32146" rIns="64291" bIns="32146">
-            <a:prstTxWarp prst="textNoShape">
-              <a:avLst/>
-            </a:prstTxWarp>
-          </a:bodyPr>
-          <a:lstStyle/>
-          <a:p>
-            <a:pPr>
-              <a:defRPr/>
-            </a:pPr>
-            <a:endParaRPr lang="en-US"/>
-          </a:p>
-        </p:txBody>
-      </p:sp>
-      <p:sp>
-        <p:nvSpPr>
-          <p:cNvPr id="7" name="Title 9"/>
-          <p:cNvSpPr txBox="1">
-            <a:spLocks/>
-          </p:cNvSpPr>
-          <p:nvPr/>
-        </p:nvSpPr>
-        <p:spPr bwMode="auto">
-          <a:xfrm>
-            <a:off x="2404849" y="3286387"/>
-            <a:ext cx="6358151" cy="2400657"/>
-          </a:xfrm>
-          <a:prstGeom prst="rect">
-            <a:avLst/>
-          </a:prstGeom>
-          <a:gradFill flip="none" rotWithShape="1">
-            <a:gsLst>
-              <a:gs pos="0">
-                <a:schemeClr val="bg1">
-                  <a:alpha val="0"/>
-                </a:schemeClr>
-              </a:gs>
-              <a:gs pos="40000">
-                <a:schemeClr val="bg1"/>
-              </a:gs>
-            </a:gsLst>
-            <a:lin ang="0" scaled="1"/>
-            <a:tileRect/>
-          </a:gradFill>
-          <a:ln w="12700">
-            <a:noFill/>
-            <a:miter lim="800000"/>
-            <a:headEnd/>
-            <a:tailEnd/>
-          </a:ln>
-        </p:spPr>
-        <p:txBody>
-          <a:bodyPr vert="horz" wrap="none" lIns="182880" tIns="182880" rIns="182880" bIns="182880" numCol="1" anchor="ctr" anchorCtr="0" compatLnSpc="1">
-            <a:prstTxWarp prst="textNoShape">
-              <a:avLst/>
-            </a:prstTxWarp>
-            <a:spAutoFit/>
-          </a:bodyPr>
-          <a:lstStyle/>
-          <a:p>
-            <a:pPr marL="0" marR="0" lvl="0" indent="0" algn="r" defTabSz="914400" rtl="0" eaLnBrk="0" fontAlgn="base" latinLnBrk="0" hangingPunct="0">
-              <a:lnSpc>
-                <a:spcPct val="100000"/>
-              </a:lnSpc>
-              <a:spcBef>
-                <a:spcPct val="0"/>
-              </a:spcBef>
-              <a:spcAft>
-                <a:spcPct val="0"/>
-              </a:spcAft>
-              <a:buClrTx/>
-              <a:buSzTx/>
-              <a:buFontTx/>
-              <a:buNone/>
-              <a:tabLst/>
-              <a:defRPr/>
-            </a:pPr>
-            <a:r>
-              <a:rPr kumimoji="0" lang="en-US" sz="6600" b="1" i="0" u="none" strike="noStrike" kern="0" cap="none" spc="0" normalizeH="0" noProof="0" dirty="0" smtClean="0">
-                <a:ln>
-                  <a:noFill/>
-                </a:ln>
-                <a:solidFill>
-                  <a:srgbClr val="9BC5E1"/>
-                </a:solidFill>
-                <a:effectLst/>
-                <a:uLnTx/>
-                <a:uFillTx/>
-                <a:latin typeface="Arial Rounded MT Bold" charset="0"/>
-                <a:ea typeface="+mj-ea"/>
-                <a:cs typeface="+mj-cs"/>
-                <a:sym typeface="Arial" charset="0"/>
-              </a:rPr>
-              <a:t>Python</a:t>
-            </a:r>
-            <a:br>
-              <a:rPr kumimoji="0" lang="en-US" sz="6600" b="1" i="0" u="none" strike="noStrike" kern="0" cap="none" spc="0" normalizeH="0" noProof="0" dirty="0" smtClean="0">
-                <a:ln>
-                  <a:noFill/>
-                </a:ln>
-                <a:solidFill>
-                  <a:srgbClr val="9BC5E1"/>
-                </a:solidFill>
-                <a:effectLst/>
-                <a:uLnTx/>
-                <a:uFillTx/>
-                <a:latin typeface="Arial Rounded MT Bold" charset="0"/>
-                <a:ea typeface="+mj-ea"/>
-                <a:cs typeface="+mj-cs"/>
-                <a:sym typeface="Arial" charset="0"/>
-              </a:rPr>
-            </a:br>
-            <a:r>
-              <a:rPr kumimoji="0" lang="en-US" sz="6600" b="1" i="0" u="none" strike="noStrike" kern="0" cap="none" spc="0" normalizeH="0" noProof="0" dirty="0" smtClean="0">
-                <a:ln>
-                  <a:noFill/>
-                </a:ln>
-                <a:solidFill>
-                  <a:srgbClr val="9BC5E1"/>
-                </a:solidFill>
-                <a:effectLst/>
-                <a:uLnTx/>
-                <a:uFillTx/>
-                <a:latin typeface="Arial Rounded MT Bold" charset="0"/>
-                <a:ea typeface="+mj-ea"/>
-                <a:cs typeface="+mj-cs"/>
-                <a:sym typeface="Arial" charset="0"/>
-              </a:rPr>
-              <a:t>demonstration</a:t>
-            </a:r>
-          </a:p>
-        </p:txBody>
-      </p:sp>
-    </p:spTree>
-  </p:cSld>
-  <p:clrMapOvr>
-    <a:masterClrMapping/>
-  </p:clrMapOvr>
-  <p:transition>
-    <p:fade/>
-  </p:transition>
-  <p:timing>
-    <p:tnLst>
-      <p:par>
-        <p:cTn id="1" dur="indefinite" restart="never" nodeType="tmRoot">
-          <p:childTnLst>
-            <p:seq concurrent="1" nextAc="seek">
-              <p:cTn id="2" dur="indefinite" nodeType="mainSeq">
-                <p:childTnLst>
-                  <p:par>
-                    <p:cTn id="3" fill="hold">
-                      <p:stCondLst>
-                        <p:cond delay="indefinite"/>
-                      </p:stCondLst>
-                      <p:childTnLst>
-                        <p:par>
-                          <p:cTn id="4" fill="hold">
-                            <p:stCondLst>
-                              <p:cond delay="0"/>
-                            </p:stCondLst>
-                            <p:childTnLst>
-                              <p:par>
-                                <p:cTn id="5" presetID="10" presetClass="entr" presetSubtype="0" fill="hold" grpId="0" nodeType="clickEffect">
-                                  <p:stCondLst>
-                                    <p:cond delay="0"/>
-                                  </p:stCondLst>
-                                  <p:childTnLst>
-                                    <p:set>
-                                      <p:cBhvr>
-                                        <p:cTn id="6" dur="1" fill="hold">
-                                          <p:stCondLst>
-                                            <p:cond delay="0"/>
-                                          </p:stCondLst>
-                                        </p:cTn>
-                                        <p:tgtEl>
-                                          <p:spTgt spid="7"/>
-                                        </p:tgtEl>
-                                        <p:attrNameLst>
-                                          <p:attrName>style.visibility</p:attrName>
-                                        </p:attrNameLst>
-                                      </p:cBhvr>
-                                      <p:to>
-                                        <p:strVal val="visible"/>
-                                      </p:to>
-                                    </p:set>
-                                    <p:animEffect transition="in" filter="fade">
-                                      <p:cBhvr>
-                                        <p:cTn id="7" dur="1000"/>
-                                        <p:tgtEl>
-                                          <p:spTgt spid="7"/>
-                                        </p:tgtEl>
-                                      </p:cBhvr>
-                                    </p:animEffect>
-                                  </p:childTnLst>
-                                </p:cTn>
-                              </p:par>
-                            </p:childTnLst>
-                          </p:cTn>
-                        </p:par>
-                      </p:childTnLst>
-                    </p:cTn>
-                  </p:par>
-                </p:childTnLst>
-              </p:cTn>
-              <p:prevCondLst>
-                <p:cond evt="onPrev" delay="0">
-                  <p:tgtEl>
-                    <p:sldTgt/>
-                  </p:tgtEl>
-                </p:cond>
-              </p:prevCondLst>
-              <p:nextCondLst>
-                <p:cond evt="onNext" delay="0">
-                  <p:tgtEl>
-                    <p:sldTgt/>
-                  </p:tgtEl>
-                </p:cond>
-              </p:nextCondLst>
-            </p:seq>
-          </p:childTnLst>
-        </p:cTn>
-      </p:par>
-    </p:tnLst>
-    <p:bldLst>
-      <p:bldP spid="7" grpId="0" animBg="1"/>
-    </p:bldLst>
-  </p:timing>
-</p:sld>
-</file>
-
-<file path=ppt/slides/slide22.xml><?xml version="1.0" encoding="utf-8"?>
-<p:sld xmlns:a="http://schemas.openxmlformats.org/drawingml/2006/main" xmlns:r="http://schemas.openxmlformats.org/officeDocument/2006/relationships" xmlns:mc="http://schemas.openxmlformats.org/markup-compatibility/2006" xmlns:mv="urn:schemas-microsoft-com:mac:vml" xmlns:p="http://schemas.openxmlformats.org/presentationml/2006/main" mc:Ignorable="mv" mc:PreserveAttributes="mv:*">
-  <p:cSld>
-    <p:spTree>
-      <p:nvGrpSpPr>
-        <p:cNvPr id="1" name=""/>
-        <p:cNvGrpSpPr/>
-        <p:nvPr/>
-      </p:nvGrpSpPr>
-      <p:grpSpPr>
-        <a:xfrm>
-          <a:off x="0" y="0"/>
-          <a:ext cx="0" cy="0"/>
-          <a:chOff x="0" y="0"/>
-          <a:chExt cx="0" cy="0"/>
-        </a:xfrm>
-      </p:grpSpPr>
-      <p:sp>
-        <p:nvSpPr>
-          <p:cNvPr id="13" name="Content Placeholder 10"/>
-          <p:cNvSpPr txBox="1">
-            <a:spLocks/>
-          </p:cNvSpPr>
-          <p:nvPr/>
-        </p:nvSpPr>
-        <p:spPr bwMode="auto">
-          <a:xfrm>
-            <a:off x="339328" y="651866"/>
-            <a:ext cx="482203" cy="5023107"/>
-          </a:xfrm>
-          <a:prstGeom prst="rect">
-            <a:avLst/>
-          </a:prstGeom>
-          <a:noFill/>
-          <a:ln w="12700">
-            <a:noFill/>
-            <a:miter lim="800000"/>
-            <a:headEnd/>
-            <a:tailEnd/>
-          </a:ln>
-        </p:spPr>
-        <p:txBody>
-          <a:bodyPr lIns="0" tIns="35717" rIns="128583" bIns="35717">
-            <a:prstTxWarp prst="textNoShape">
-              <a:avLst/>
-            </a:prstTxWarp>
-          </a:bodyPr>
-          <a:lstStyle/>
-          <a:p>
-            <a:pPr algn="r" eaLnBrk="0" hangingPunct="0">
-              <a:spcBef>
-                <a:spcPts val="0"/>
-              </a:spcBef>
-              <a:spcAft>
-                <a:spcPts val="0"/>
-              </a:spcAft>
-              <a:buClr>
-                <a:srgbClr val="FF7A24"/>
-              </a:buClr>
-              <a:buSzPct val="100000"/>
-              <a:defRPr/>
-            </a:pPr>
-            <a:endParaRPr lang="en-US" sz="1300" kern="0" dirty="0">
-              <a:solidFill>
-                <a:schemeClr val="tx1">
-                  <a:lumMod val="85000"/>
-                  <a:lumOff val="15000"/>
-                </a:schemeClr>
-              </a:solidFill>
-              <a:latin typeface="Inconsolata"/>
-              <a:ea typeface="+mn-ea"/>
-              <a:cs typeface="+mn-cs"/>
-              <a:sym typeface="Arial" charset="0"/>
-            </a:endParaRPr>
-          </a:p>
-          <a:p>
-            <a:pPr algn="r" eaLnBrk="0" hangingPunct="0">
-              <a:spcBef>
-                <a:spcPts val="0"/>
-              </a:spcBef>
-              <a:spcAft>
-                <a:spcPts val="0"/>
-              </a:spcAft>
-              <a:buClr>
-                <a:srgbClr val="FF7A24"/>
-              </a:buClr>
-              <a:buSzPct val="100000"/>
-              <a:defRPr/>
-            </a:pPr>
-            <a:endParaRPr lang="en-US" sz="1300" kern="0" dirty="0">
-              <a:solidFill>
-                <a:schemeClr val="tx1">
-                  <a:lumMod val="85000"/>
-                  <a:lumOff val="15000"/>
-                </a:schemeClr>
-              </a:solidFill>
-              <a:latin typeface="Inconsolata"/>
-              <a:ea typeface="+mn-ea"/>
-              <a:cs typeface="+mn-cs"/>
-              <a:sym typeface="Arial" charset="0"/>
-            </a:endParaRPr>
-          </a:p>
-          <a:p>
-            <a:pPr algn="r" eaLnBrk="0" hangingPunct="0">
-              <a:spcBef>
-                <a:spcPts val="0"/>
-              </a:spcBef>
-              <a:spcAft>
-                <a:spcPts val="0"/>
-              </a:spcAft>
-              <a:buClr>
-                <a:srgbClr val="FF7A24"/>
-              </a:buClr>
-              <a:buSzPct val="100000"/>
-              <a:defRPr/>
-            </a:pPr>
-            <a:endParaRPr lang="en-US" sz="1300" kern="0" dirty="0">
-              <a:solidFill>
-                <a:schemeClr val="tx1">
-                  <a:lumMod val="85000"/>
-                  <a:lumOff val="15000"/>
-                </a:schemeClr>
-              </a:solidFill>
-              <a:latin typeface="Inconsolata"/>
-              <a:ea typeface="+mn-ea"/>
-              <a:cs typeface="+mn-cs"/>
-              <a:sym typeface="Arial" charset="0"/>
-            </a:endParaRPr>
-          </a:p>
-          <a:p>
-            <a:pPr algn="r" eaLnBrk="0" hangingPunct="0">
-              <a:spcBef>
-                <a:spcPts val="0"/>
-              </a:spcBef>
-              <a:spcAft>
-                <a:spcPts val="0"/>
-              </a:spcAft>
-              <a:buClr>
-                <a:srgbClr val="FF7A24"/>
-              </a:buClr>
-              <a:buSzPct val="100000"/>
-              <a:defRPr/>
-            </a:pPr>
-            <a:endParaRPr lang="en-US" sz="1300" kern="0" dirty="0">
-              <a:solidFill>
-                <a:schemeClr val="tx1">
-                  <a:lumMod val="85000"/>
-                  <a:lumOff val="15000"/>
-                </a:schemeClr>
-              </a:solidFill>
-              <a:latin typeface="Inconsolata"/>
-              <a:ea typeface="+mn-ea"/>
-              <a:cs typeface="+mn-cs"/>
-              <a:sym typeface="Arial" charset="0"/>
-            </a:endParaRPr>
-          </a:p>
-          <a:p>
-            <a:pPr algn="r" eaLnBrk="0" hangingPunct="0">
-              <a:spcBef>
-                <a:spcPts val="0"/>
-              </a:spcBef>
-              <a:spcAft>
-                <a:spcPts val="0"/>
-              </a:spcAft>
-              <a:buClr>
-                <a:srgbClr val="FF7A24"/>
-              </a:buClr>
-              <a:buSzPct val="100000"/>
-              <a:defRPr/>
-            </a:pPr>
-            <a:endParaRPr lang="en-US" sz="1300" kern="0" dirty="0">
-              <a:solidFill>
-                <a:schemeClr val="tx1">
-                  <a:lumMod val="85000"/>
-                  <a:lumOff val="15000"/>
-                </a:schemeClr>
-              </a:solidFill>
-              <a:latin typeface="Inconsolata"/>
-              <a:ea typeface="+mn-ea"/>
-              <a:cs typeface="+mn-cs"/>
-              <a:sym typeface="Arial" charset="0"/>
-            </a:endParaRPr>
-          </a:p>
-          <a:p>
-            <a:pPr algn="r" eaLnBrk="0" hangingPunct="0">
-              <a:spcBef>
-                <a:spcPts val="0"/>
-              </a:spcBef>
-              <a:spcAft>
-                <a:spcPts val="0"/>
-              </a:spcAft>
-              <a:buClr>
-                <a:srgbClr val="FF7A24"/>
-              </a:buClr>
-              <a:buSzPct val="100000"/>
-              <a:defRPr/>
-            </a:pPr>
-            <a:endParaRPr lang="en-US" sz="1300" kern="0" dirty="0">
-              <a:solidFill>
-                <a:schemeClr val="tx1">
-                  <a:lumMod val="85000"/>
-                  <a:lumOff val="15000"/>
-                </a:schemeClr>
-              </a:solidFill>
-              <a:latin typeface="Inconsolata"/>
-              <a:ea typeface="+mn-ea"/>
-              <a:cs typeface="+mn-cs"/>
-              <a:sym typeface="Arial" charset="0"/>
-            </a:endParaRPr>
-          </a:p>
-          <a:p>
-            <a:pPr algn="r" eaLnBrk="0" hangingPunct="0">
-              <a:spcBef>
-                <a:spcPts val="0"/>
-              </a:spcBef>
-              <a:spcAft>
-                <a:spcPts val="0"/>
-              </a:spcAft>
-              <a:buClr>
-                <a:srgbClr val="FF7A24"/>
-              </a:buClr>
-              <a:buSzPct val="100000"/>
-              <a:defRPr/>
-            </a:pPr>
-            <a:endParaRPr lang="en-US" sz="1300" kern="0" dirty="0">
-              <a:solidFill>
-                <a:schemeClr val="tx1">
-                  <a:lumMod val="85000"/>
-                  <a:lumOff val="15000"/>
-                </a:schemeClr>
-              </a:solidFill>
-              <a:latin typeface="Inconsolata"/>
-              <a:ea typeface="+mn-ea"/>
-              <a:cs typeface="+mn-cs"/>
-              <a:sym typeface="Arial" charset="0"/>
-            </a:endParaRPr>
-          </a:p>
-          <a:p>
-            <a:pPr algn="r" eaLnBrk="0" hangingPunct="0">
-              <a:spcBef>
-                <a:spcPts val="0"/>
-              </a:spcBef>
-              <a:spcAft>
-                <a:spcPts val="0"/>
-              </a:spcAft>
-              <a:buClr>
-                <a:srgbClr val="FF7A24"/>
-              </a:buClr>
-              <a:buSzPct val="100000"/>
-              <a:defRPr/>
-            </a:pPr>
-            <a:endParaRPr lang="en-US" sz="1300" kern="0" dirty="0">
-              <a:solidFill>
-                <a:schemeClr val="tx1">
-                  <a:lumMod val="85000"/>
-                  <a:lumOff val="15000"/>
-                </a:schemeClr>
-              </a:solidFill>
-              <a:latin typeface="Inconsolata"/>
-              <a:ea typeface="+mn-ea"/>
-              <a:cs typeface="+mn-cs"/>
-              <a:sym typeface="Arial" charset="0"/>
-            </a:endParaRPr>
-          </a:p>
-          <a:p>
-            <a:pPr algn="r" eaLnBrk="0" hangingPunct="0">
-              <a:spcBef>
-                <a:spcPts val="0"/>
-              </a:spcBef>
-              <a:spcAft>
-                <a:spcPts val="0"/>
-              </a:spcAft>
-              <a:buClr>
-                <a:srgbClr val="FF7A24"/>
-              </a:buClr>
-              <a:buSzPct val="100000"/>
-              <a:defRPr/>
-            </a:pPr>
-            <a:r>
-              <a:rPr lang="en-US" sz="1300" kern="0" dirty="0">
-                <a:solidFill>
-                  <a:schemeClr val="tx1">
-                    <a:lumMod val="85000"/>
-                    <a:lumOff val="15000"/>
-                  </a:schemeClr>
-                </a:solidFill>
-                <a:latin typeface="Inconsolata"/>
-                <a:ea typeface="+mn-ea"/>
-                <a:cs typeface="+mn-cs"/>
-                <a:sym typeface="Arial" charset="0"/>
-              </a:rPr>
-              <a:t>1</a:t>
-            </a:r>
-          </a:p>
-          <a:p>
-            <a:pPr algn="r" eaLnBrk="0" hangingPunct="0">
-              <a:spcBef>
-                <a:spcPts val="0"/>
-              </a:spcBef>
-              <a:spcAft>
-                <a:spcPts val="0"/>
-              </a:spcAft>
-              <a:buClr>
-                <a:srgbClr val="FF7A24"/>
-              </a:buClr>
-              <a:buSzPct val="100000"/>
-              <a:defRPr/>
-            </a:pPr>
-            <a:r>
-              <a:rPr lang="en-US" sz="1300" kern="0" dirty="0">
-                <a:solidFill>
-                  <a:schemeClr val="tx1">
-                    <a:lumMod val="85000"/>
-                    <a:lumOff val="15000"/>
-                  </a:schemeClr>
-                </a:solidFill>
-                <a:latin typeface="Inconsolata"/>
-                <a:ea typeface="+mn-ea"/>
-                <a:cs typeface="+mn-cs"/>
-                <a:sym typeface="Arial" charset="0"/>
-              </a:rPr>
-              <a:t>2</a:t>
-            </a:r>
-          </a:p>
-          <a:p>
-            <a:pPr algn="r" eaLnBrk="0" hangingPunct="0">
-              <a:spcBef>
-                <a:spcPts val="0"/>
-              </a:spcBef>
-              <a:spcAft>
-                <a:spcPts val="0"/>
-              </a:spcAft>
-              <a:buClr>
-                <a:srgbClr val="FF7A24"/>
-              </a:buClr>
-              <a:buSzPct val="100000"/>
-              <a:defRPr/>
-            </a:pPr>
-            <a:r>
-              <a:rPr lang="en-US" sz="1300" kern="0" dirty="0">
-                <a:solidFill>
-                  <a:schemeClr val="tx1">
-                    <a:lumMod val="85000"/>
-                    <a:lumOff val="15000"/>
-                  </a:schemeClr>
-                </a:solidFill>
-                <a:latin typeface="Inconsolata"/>
-                <a:ea typeface="+mn-ea"/>
-                <a:cs typeface="+mn-cs"/>
-                <a:sym typeface="Arial" charset="0"/>
-              </a:rPr>
-              <a:t>3</a:t>
-            </a:r>
-          </a:p>
-          <a:p>
-            <a:pPr algn="r" eaLnBrk="0" hangingPunct="0">
-              <a:spcBef>
-                <a:spcPts val="0"/>
-              </a:spcBef>
-              <a:spcAft>
-                <a:spcPts val="0"/>
-              </a:spcAft>
-              <a:buClr>
-                <a:srgbClr val="FF7A24"/>
-              </a:buClr>
-              <a:buSzPct val="100000"/>
-              <a:defRPr/>
-            </a:pPr>
-            <a:r>
-              <a:rPr lang="en-US" sz="1300" kern="0" dirty="0">
-                <a:solidFill>
-                  <a:schemeClr val="tx1">
-                    <a:lumMod val="85000"/>
-                    <a:lumOff val="15000"/>
-                  </a:schemeClr>
-                </a:solidFill>
-                <a:latin typeface="Inconsolata"/>
-                <a:ea typeface="+mn-ea"/>
-                <a:cs typeface="+mn-cs"/>
-                <a:sym typeface="Arial" charset="0"/>
-              </a:rPr>
-              <a:t>4</a:t>
-            </a:r>
-          </a:p>
-          <a:p>
-            <a:pPr algn="r" eaLnBrk="0" hangingPunct="0">
-              <a:spcBef>
-                <a:spcPts val="0"/>
-              </a:spcBef>
-              <a:spcAft>
-                <a:spcPts val="0"/>
-              </a:spcAft>
-              <a:buClr>
-                <a:srgbClr val="FF7A24"/>
-              </a:buClr>
-              <a:buSzPct val="100000"/>
-              <a:defRPr/>
-            </a:pPr>
-            <a:r>
-              <a:rPr lang="en-US" sz="1300" kern="0" dirty="0">
-                <a:solidFill>
-                  <a:schemeClr val="tx1">
-                    <a:lumMod val="85000"/>
-                    <a:lumOff val="15000"/>
-                  </a:schemeClr>
-                </a:solidFill>
-                <a:latin typeface="Inconsolata"/>
-                <a:ea typeface="+mn-ea"/>
-                <a:cs typeface="+mn-cs"/>
-                <a:sym typeface="Arial" charset="0"/>
-              </a:rPr>
-              <a:t>5</a:t>
-            </a:r>
-          </a:p>
-          <a:p>
-            <a:pPr algn="r" eaLnBrk="0" hangingPunct="0">
-              <a:spcBef>
-                <a:spcPts val="0"/>
-              </a:spcBef>
-              <a:spcAft>
-                <a:spcPts val="0"/>
-              </a:spcAft>
-              <a:buClr>
-                <a:srgbClr val="FF7A24"/>
-              </a:buClr>
-              <a:buSzPct val="100000"/>
-              <a:defRPr/>
-            </a:pPr>
-            <a:r>
-              <a:rPr lang="en-US" sz="1300" kern="0" dirty="0">
-                <a:solidFill>
-                  <a:schemeClr val="tx1">
-                    <a:lumMod val="85000"/>
-                    <a:lumOff val="15000"/>
-                  </a:schemeClr>
-                </a:solidFill>
-                <a:latin typeface="Inconsolata"/>
-                <a:ea typeface="+mn-ea"/>
-                <a:cs typeface="+mn-cs"/>
-                <a:sym typeface="Arial" charset="0"/>
-              </a:rPr>
-              <a:t>6</a:t>
-            </a:r>
-          </a:p>
-          <a:p>
-            <a:pPr algn="r" eaLnBrk="0" hangingPunct="0">
-              <a:spcBef>
-                <a:spcPts val="0"/>
-              </a:spcBef>
-              <a:spcAft>
-                <a:spcPts val="0"/>
-              </a:spcAft>
-              <a:buClr>
-                <a:srgbClr val="FF7A24"/>
-              </a:buClr>
-              <a:buSzPct val="100000"/>
-              <a:defRPr/>
-            </a:pPr>
-            <a:r>
-              <a:rPr lang="en-US" sz="1300" kern="0" dirty="0">
-                <a:solidFill>
-                  <a:schemeClr val="tx1">
-                    <a:lumMod val="85000"/>
-                    <a:lumOff val="15000"/>
-                  </a:schemeClr>
-                </a:solidFill>
-                <a:latin typeface="Inconsolata"/>
-                <a:ea typeface="+mn-ea"/>
-                <a:cs typeface="+mn-cs"/>
-                <a:sym typeface="Arial" charset="0"/>
-              </a:rPr>
-              <a:t>7</a:t>
-            </a:r>
-          </a:p>
-          <a:p>
-            <a:pPr algn="r" eaLnBrk="0" hangingPunct="0">
-              <a:spcBef>
-                <a:spcPts val="0"/>
-              </a:spcBef>
-              <a:spcAft>
-                <a:spcPts val="0"/>
-              </a:spcAft>
-              <a:buClr>
-                <a:srgbClr val="FF7A24"/>
-              </a:buClr>
-              <a:buSzPct val="100000"/>
-              <a:defRPr/>
-            </a:pPr>
-            <a:r>
-              <a:rPr lang="en-US" sz="1300" kern="0" dirty="0">
-                <a:solidFill>
-                  <a:schemeClr val="tx1">
-                    <a:lumMod val="85000"/>
-                    <a:lumOff val="15000"/>
-                  </a:schemeClr>
-                </a:solidFill>
-                <a:latin typeface="Inconsolata"/>
-                <a:ea typeface="+mn-ea"/>
-                <a:cs typeface="+mn-cs"/>
-                <a:sym typeface="Arial" charset="0"/>
-              </a:rPr>
-              <a:t>8</a:t>
-            </a:r>
-          </a:p>
-          <a:p>
-            <a:pPr algn="r" eaLnBrk="0" hangingPunct="0">
-              <a:spcBef>
-                <a:spcPts val="0"/>
-              </a:spcBef>
-              <a:spcAft>
-                <a:spcPts val="0"/>
-              </a:spcAft>
-              <a:buClr>
-                <a:srgbClr val="FF7A24"/>
-              </a:buClr>
-              <a:buSzPct val="100000"/>
-              <a:defRPr/>
-            </a:pPr>
-            <a:r>
-              <a:rPr lang="en-US" sz="1300" kern="0" dirty="0">
-                <a:solidFill>
-                  <a:schemeClr val="tx1">
-                    <a:lumMod val="85000"/>
-                    <a:lumOff val="15000"/>
-                  </a:schemeClr>
-                </a:solidFill>
-                <a:latin typeface="Inconsolata"/>
-                <a:ea typeface="+mn-ea"/>
-                <a:cs typeface="+mn-cs"/>
-                <a:sym typeface="Arial" charset="0"/>
-              </a:rPr>
-              <a:t>9</a:t>
-            </a:r>
-          </a:p>
-          <a:p>
-            <a:pPr algn="r" eaLnBrk="0" hangingPunct="0">
-              <a:spcBef>
-                <a:spcPts val="0"/>
-              </a:spcBef>
-              <a:spcAft>
-                <a:spcPts val="0"/>
-              </a:spcAft>
-              <a:buClr>
-                <a:srgbClr val="FF7A24"/>
-              </a:buClr>
-              <a:buSzPct val="100000"/>
-              <a:defRPr/>
-            </a:pPr>
-            <a:r>
-              <a:rPr lang="en-US" sz="1300" kern="0" dirty="0">
-                <a:solidFill>
-                  <a:schemeClr val="tx1">
-                    <a:lumMod val="85000"/>
-                    <a:lumOff val="15000"/>
-                  </a:schemeClr>
-                </a:solidFill>
-                <a:latin typeface="Inconsolata"/>
-                <a:ea typeface="+mn-ea"/>
-                <a:cs typeface="+mn-cs"/>
-                <a:sym typeface="Arial" charset="0"/>
-              </a:rPr>
-              <a:t>10</a:t>
-            </a:r>
-          </a:p>
-          <a:p>
-            <a:pPr algn="r" eaLnBrk="0" hangingPunct="0">
-              <a:spcBef>
-                <a:spcPts val="0"/>
-              </a:spcBef>
-              <a:spcAft>
-                <a:spcPts val="0"/>
-              </a:spcAft>
-              <a:buClr>
-                <a:srgbClr val="FF7A24"/>
-              </a:buClr>
-              <a:buSzPct val="100000"/>
-              <a:defRPr/>
-            </a:pPr>
-            <a:r>
-              <a:rPr lang="en-US" sz="1300" kern="0" dirty="0" smtClean="0">
-                <a:solidFill>
-                  <a:schemeClr val="tx1">
-                    <a:lumMod val="85000"/>
-                    <a:lumOff val="15000"/>
-                  </a:schemeClr>
-                </a:solidFill>
-                <a:latin typeface="Inconsolata"/>
-                <a:ea typeface="+mn-ea"/>
-                <a:cs typeface="+mn-cs"/>
-                <a:sym typeface="Arial" charset="0"/>
-              </a:rPr>
-              <a:t>11</a:t>
-            </a:r>
-          </a:p>
-        </p:txBody>
-      </p:sp>
-      <p:sp>
-        <p:nvSpPr>
-          <p:cNvPr id="51203" name="Title 9"/>
-          <p:cNvSpPr>
-            <a:spLocks noGrp="1"/>
-          </p:cNvSpPr>
-          <p:nvPr>
-            <p:ph type="title"/>
-          </p:nvPr>
-        </p:nvSpPr>
-        <p:spPr/>
-        <p:txBody>
-          <a:bodyPr/>
-          <a:lstStyle/>
-          <a:p>
-            <a:r>
-              <a:rPr lang="en-US" dirty="0" smtClean="0">
-                <a:latin typeface="Arial Rounded MT Bold" charset="0"/>
-              </a:rPr>
-              <a:t>JavaScript example</a:t>
-            </a:r>
-          </a:p>
-        </p:txBody>
-      </p:sp>
-      <p:sp>
-        <p:nvSpPr>
-          <p:cNvPr id="51204" name="Content Placeholder 10"/>
-          <p:cNvSpPr>
-            <a:spLocks noGrp="1"/>
-          </p:cNvSpPr>
-          <p:nvPr>
-            <p:ph idx="1"/>
-          </p:nvPr>
-        </p:nvSpPr>
-        <p:spPr>
-          <a:xfrm>
-            <a:off x="982266" y="651866"/>
-            <a:ext cx="7744271" cy="5023107"/>
-          </a:xfrm>
-        </p:spPr>
-        <p:txBody>
-          <a:bodyPr>
-            <a:noAutofit/>
-          </a:bodyPr>
-          <a:lstStyle/>
-          <a:p>
-            <a:pPr marL="0" indent="0">
-              <a:lnSpc>
-                <a:spcPct val="100000"/>
-              </a:lnSpc>
-              <a:spcBef>
-                <a:spcPct val="0"/>
-              </a:spcBef>
-              <a:spcAft>
-                <a:spcPct val="0"/>
-              </a:spcAft>
-              <a:buNone/>
-            </a:pPr>
-            <a:r>
-              <a:rPr lang="en-US" sz="1300" noProof="1" smtClean="0">
-                <a:solidFill>
-                  <a:schemeClr val="tx1">
-                    <a:lumMod val="85000"/>
-                    <a:lumOff val="15000"/>
-                  </a:schemeClr>
-                </a:solidFill>
-                <a:latin typeface="Inconsolata"/>
-              </a:rPr>
-              <a:t>&lt;!DOCTYPE html PUBLIC "-//W3C//DTD XHTML 1.0 Strict//EN”</a:t>
-            </a:r>
-          </a:p>
-          <a:p>
-            <a:pPr marL="0" indent="0">
-              <a:lnSpc>
-                <a:spcPct val="100000"/>
-              </a:lnSpc>
-              <a:spcBef>
-                <a:spcPct val="0"/>
-              </a:spcBef>
-              <a:spcAft>
-                <a:spcPct val="0"/>
-              </a:spcAft>
-              <a:buNone/>
-            </a:pPr>
-            <a:r>
-              <a:rPr lang="en-US" sz="1300" noProof="1" smtClean="0">
-                <a:solidFill>
-                  <a:schemeClr val="tx1">
-                    <a:lumMod val="85000"/>
-                    <a:lumOff val="15000"/>
-                  </a:schemeClr>
-                </a:solidFill>
-                <a:latin typeface="Inconsolata"/>
-              </a:rPr>
-              <a:t>    "http://www.w3.org/TR/xhtml1/DTD/xhtml1-strict.dtd"&gt;</a:t>
-            </a:r>
-          </a:p>
-          <a:p>
-            <a:pPr marL="0" indent="0">
-              <a:lnSpc>
-                <a:spcPct val="100000"/>
-              </a:lnSpc>
-              <a:spcBef>
-                <a:spcPct val="0"/>
-              </a:spcBef>
-              <a:spcAft>
-                <a:spcPct val="0"/>
-              </a:spcAft>
-              <a:buNone/>
-            </a:pPr>
-            <a:endParaRPr lang="en-US" sz="1300" noProof="1" smtClean="0">
-              <a:solidFill>
-                <a:schemeClr val="tx1">
-                  <a:lumMod val="85000"/>
-                  <a:lumOff val="15000"/>
-                </a:schemeClr>
-              </a:solidFill>
-              <a:latin typeface="Inconsolata"/>
-            </a:endParaRPr>
-          </a:p>
-          <a:p>
-            <a:pPr marL="0" indent="0">
-              <a:lnSpc>
-                <a:spcPct val="100000"/>
-              </a:lnSpc>
-              <a:spcBef>
-                <a:spcPct val="0"/>
-              </a:spcBef>
-              <a:spcAft>
-                <a:spcPct val="0"/>
-              </a:spcAft>
-              <a:buNone/>
-            </a:pPr>
-            <a:r>
-              <a:rPr lang="en-US" sz="1300" noProof="1" smtClean="0">
-                <a:solidFill>
-                  <a:schemeClr val="tx1">
-                    <a:lumMod val="85000"/>
-                    <a:lumOff val="15000"/>
-                  </a:schemeClr>
-                </a:solidFill>
-                <a:latin typeface="Inconsolata"/>
-              </a:rPr>
-              <a:t>&lt;html xmlns="http://www.w3.org/1999/xhtml" xml:lang="en" lang="en"&gt;</a:t>
-            </a:r>
-          </a:p>
-          <a:p>
-            <a:pPr marL="0" indent="0">
-              <a:lnSpc>
-                <a:spcPct val="100000"/>
-              </a:lnSpc>
-              <a:spcBef>
-                <a:spcPct val="0"/>
-              </a:spcBef>
-              <a:spcAft>
-                <a:spcPct val="0"/>
-              </a:spcAft>
-              <a:buNone/>
-            </a:pPr>
-            <a:r>
-              <a:rPr lang="en-US" sz="1300" noProof="1" smtClean="0">
-                <a:solidFill>
-                  <a:schemeClr val="tx1">
-                    <a:lumMod val="85000"/>
-                    <a:lumOff val="15000"/>
-                  </a:schemeClr>
-                </a:solidFill>
-                <a:latin typeface="Inconsolata"/>
-              </a:rPr>
-              <a:t>  &lt;head&gt;</a:t>
-            </a:r>
-          </a:p>
-          <a:p>
-            <a:pPr marL="0" indent="0">
-              <a:lnSpc>
-                <a:spcPct val="100000"/>
-              </a:lnSpc>
-              <a:spcBef>
-                <a:spcPct val="0"/>
-              </a:spcBef>
-              <a:spcAft>
-                <a:spcPct val="0"/>
-              </a:spcAft>
-              <a:buNone/>
-            </a:pPr>
-            <a:r>
-              <a:rPr lang="en-US" sz="1300" noProof="1" smtClean="0">
-                <a:solidFill>
-                  <a:schemeClr val="tx1">
-                    <a:lumMod val="85000"/>
-                    <a:lumOff val="15000"/>
-                  </a:schemeClr>
-                </a:solidFill>
-                <a:latin typeface="Inconsolata"/>
-              </a:rPr>
-              <a:t>    &lt;script src="/dbrelay/js/jquery/jquery-1.4.2.min.js" &gt;&lt;/script&gt;</a:t>
-            </a:r>
-          </a:p>
-          <a:p>
-            <a:pPr marL="0" indent="0">
-              <a:lnSpc>
-                <a:spcPct val="100000"/>
-              </a:lnSpc>
-              <a:spcBef>
-                <a:spcPct val="0"/>
-              </a:spcBef>
-              <a:spcAft>
-                <a:spcPct val="0"/>
-              </a:spcAft>
-              <a:buNone/>
-            </a:pPr>
-            <a:r>
-              <a:rPr lang="en-US" sz="1300" noProof="1" smtClean="0">
-                <a:solidFill>
-                  <a:schemeClr val="tx1">
-                    <a:lumMod val="85000"/>
-                    <a:lumOff val="15000"/>
-                  </a:schemeClr>
-                </a:solidFill>
-                <a:latin typeface="Inconsolata"/>
-              </a:rPr>
-              <a:t>    &lt;script&gt;</a:t>
-            </a:r>
-          </a:p>
-          <a:p>
-            <a:pPr marL="0" indent="0">
-              <a:lnSpc>
-                <a:spcPct val="100000"/>
-              </a:lnSpc>
-              <a:spcBef>
-                <a:spcPct val="0"/>
-              </a:spcBef>
-              <a:spcAft>
-                <a:spcPct val="0"/>
-              </a:spcAft>
-              <a:buNone/>
-            </a:pPr>
-            <a:endParaRPr lang="en-US" sz="1300" noProof="1" smtClean="0">
-              <a:solidFill>
-                <a:schemeClr val="tx1">
-                  <a:lumMod val="85000"/>
-                  <a:lumOff val="15000"/>
-                </a:schemeClr>
-              </a:solidFill>
-              <a:latin typeface="Inconsolata"/>
-            </a:endParaRPr>
-          </a:p>
-          <a:p>
-            <a:pPr marL="0" indent="0">
-              <a:lnSpc>
-                <a:spcPct val="100000"/>
-              </a:lnSpc>
-              <a:spcBef>
-                <a:spcPct val="0"/>
-              </a:spcBef>
-              <a:spcAft>
-                <a:spcPct val="0"/>
-              </a:spcAft>
-              <a:buNone/>
-            </a:pPr>
-            <a:r>
-              <a:rPr lang="en-US" sz="1300" noProof="1" smtClean="0">
-                <a:solidFill>
-                  <a:schemeClr val="tx1">
-                    <a:lumMod val="85000"/>
-                    <a:lumOff val="15000"/>
-                  </a:schemeClr>
-                </a:solidFill>
-                <a:latin typeface="Inconsolata"/>
-              </a:rPr>
-              <a:t>     jQuery.post( "/sql", {</a:t>
-            </a:r>
-          </a:p>
-          <a:p>
-            <a:pPr marL="0" indent="0">
-              <a:lnSpc>
-                <a:spcPct val="100000"/>
-              </a:lnSpc>
-              <a:spcBef>
-                <a:spcPct val="0"/>
-              </a:spcBef>
-              <a:spcAft>
-                <a:spcPct val="0"/>
-              </a:spcAft>
-              <a:buNone/>
-            </a:pPr>
-            <a:r>
-              <a:rPr lang="en-US" sz="1300" noProof="1" smtClean="0">
-                <a:solidFill>
-                  <a:schemeClr val="tx1">
-                    <a:lumMod val="85000"/>
-                    <a:lumOff val="15000"/>
-                  </a:schemeClr>
-                </a:solidFill>
-                <a:latin typeface="Inconsolata"/>
-              </a:rPr>
-              <a:t>        connection_name : "dbrelay@oscon",</a:t>
-            </a:r>
-          </a:p>
-          <a:p>
-            <a:pPr marL="0" indent="0">
-              <a:lnSpc>
-                <a:spcPct val="100000"/>
-              </a:lnSpc>
-              <a:spcBef>
-                <a:spcPct val="0"/>
-              </a:spcBef>
-              <a:spcAft>
-                <a:spcPct val="0"/>
-              </a:spcAft>
-              <a:buNone/>
-            </a:pPr>
-            <a:r>
-              <a:rPr lang="en-US" sz="1300" noProof="1" smtClean="0">
-                <a:solidFill>
-                  <a:schemeClr val="tx1">
-                    <a:lumMod val="85000"/>
-                    <a:lumOff val="15000"/>
-                  </a:schemeClr>
-                </a:solidFill>
-                <a:latin typeface="Inconsolata"/>
-              </a:rPr>
-              <a:t>        sql_server      : "sqlserver",</a:t>
-            </a:r>
-          </a:p>
-          <a:p>
-            <a:pPr marL="0" indent="0">
-              <a:lnSpc>
-                <a:spcPct val="100000"/>
-              </a:lnSpc>
-              <a:spcBef>
-                <a:spcPct val="0"/>
-              </a:spcBef>
-              <a:spcAft>
-                <a:spcPct val="0"/>
-              </a:spcAft>
-              <a:buNone/>
-            </a:pPr>
-            <a:r>
-              <a:rPr lang="en-US" sz="1300" noProof="1" smtClean="0">
-                <a:solidFill>
-                  <a:schemeClr val="tx1">
-                    <a:lumMod val="85000"/>
-                    <a:lumOff val="15000"/>
-                  </a:schemeClr>
-                </a:solidFill>
-                <a:latin typeface="Inconsolata"/>
-              </a:rPr>
-              <a:t>        sql_user        : "demo",</a:t>
-            </a:r>
-          </a:p>
-          <a:p>
-            <a:pPr marL="0" indent="0">
-              <a:lnSpc>
-                <a:spcPct val="100000"/>
-              </a:lnSpc>
-              <a:spcBef>
-                <a:spcPct val="0"/>
-              </a:spcBef>
-              <a:spcAft>
-                <a:spcPct val="0"/>
-              </a:spcAft>
-              <a:buNone/>
-            </a:pPr>
-            <a:r>
-              <a:rPr lang="en-US" sz="1300" noProof="1" smtClean="0">
-                <a:solidFill>
-                  <a:schemeClr val="tx1">
-                    <a:lumMod val="85000"/>
-                    <a:lumOff val="15000"/>
-                  </a:schemeClr>
-                </a:solidFill>
-                <a:latin typeface="Inconsolata"/>
-              </a:rPr>
-              <a:t>        sql_password    : "demo",</a:t>
-            </a:r>
-          </a:p>
-          <a:p>
-            <a:pPr marL="0" indent="0">
-              <a:lnSpc>
-                <a:spcPct val="100000"/>
-              </a:lnSpc>
-              <a:spcBef>
-                <a:spcPct val="0"/>
-              </a:spcBef>
-              <a:spcAft>
-                <a:spcPct val="0"/>
-              </a:spcAft>
-              <a:buNone/>
-            </a:pPr>
-            <a:r>
-              <a:rPr lang="en-US" sz="1300" noProof="1" smtClean="0">
-                <a:solidFill>
-                  <a:schemeClr val="tx1">
-                    <a:lumMod val="85000"/>
-                    <a:lumOff val="15000"/>
-                  </a:schemeClr>
-                </a:solidFill>
-                <a:latin typeface="Inconsolata"/>
-              </a:rPr>
-              <a:t>        sql             : "select count(*) as employees from HumanResources.vEmployee"</a:t>
-            </a:r>
-          </a:p>
-          <a:p>
-            <a:pPr marL="0" indent="0">
-              <a:lnSpc>
-                <a:spcPct val="100000"/>
-              </a:lnSpc>
-              <a:spcBef>
-                <a:spcPct val="0"/>
-              </a:spcBef>
-              <a:spcAft>
-                <a:spcPct val="0"/>
-              </a:spcAft>
-              <a:buNone/>
-            </a:pPr>
-            <a:r>
-              <a:rPr lang="en-US" sz="1300" noProof="1" smtClean="0">
-                <a:solidFill>
-                  <a:schemeClr val="tx1">
-                    <a:lumMod val="85000"/>
-                    <a:lumOff val="15000"/>
-                  </a:schemeClr>
-                </a:solidFill>
-                <a:latin typeface="Inconsolata"/>
-              </a:rPr>
-              <a:t>      }, function( response ) {</a:t>
-            </a:r>
-          </a:p>
-          <a:p>
-            <a:pPr marL="0" indent="0">
-              <a:lnSpc>
-                <a:spcPct val="100000"/>
-              </a:lnSpc>
-              <a:spcBef>
-                <a:spcPct val="0"/>
-              </a:spcBef>
-              <a:spcAft>
-                <a:spcPct val="0"/>
-              </a:spcAft>
-              <a:buNone/>
-            </a:pPr>
-            <a:r>
-              <a:rPr lang="en-US" sz="1300" noProof="1" smtClean="0">
-                <a:solidFill>
-                  <a:schemeClr val="tx1">
-                    <a:lumMod val="85000"/>
-                    <a:lumOff val="15000"/>
-                  </a:schemeClr>
-                </a:solidFill>
-                <a:latin typeface="Inconsolata"/>
-              </a:rPr>
-              <a:t>        jQuery("body").html(</a:t>
-            </a:r>
-          </a:p>
-          <a:p>
-            <a:pPr marL="0" indent="0">
-              <a:lnSpc>
-                <a:spcPct val="100000"/>
-              </a:lnSpc>
-              <a:spcBef>
-                <a:spcPct val="0"/>
-              </a:spcBef>
-              <a:spcAft>
-                <a:spcPct val="0"/>
-              </a:spcAft>
-              <a:buNone/>
-            </a:pPr>
-            <a:r>
-              <a:rPr lang="en-US" sz="1300" noProof="1" smtClean="0">
-                <a:solidFill>
-                  <a:schemeClr val="tx1">
-                    <a:lumMod val="85000"/>
-                    <a:lumOff val="15000"/>
-                  </a:schemeClr>
-                </a:solidFill>
-                <a:latin typeface="Inconsolata"/>
-              </a:rPr>
-              <a:t>          "&lt;p&gt;" + response.data[0].rows[0].employees + " employees&lt;/p&gt;”</a:t>
-            </a:r>
-          </a:p>
-          <a:p>
-            <a:pPr marL="0" indent="0">
-              <a:lnSpc>
-                <a:spcPct val="100000"/>
-              </a:lnSpc>
-              <a:spcBef>
-                <a:spcPct val="0"/>
-              </a:spcBef>
-              <a:spcAft>
-                <a:spcPct val="0"/>
-              </a:spcAft>
-              <a:buNone/>
-            </a:pPr>
-            <a:r>
-              <a:rPr lang="en-US" sz="1300" noProof="1" smtClean="0">
-                <a:solidFill>
-                  <a:schemeClr val="tx1">
-                    <a:lumMod val="85000"/>
-                    <a:lumOff val="15000"/>
-                  </a:schemeClr>
-                </a:solidFill>
-                <a:latin typeface="Inconsolata"/>
-              </a:rPr>
-              <a:t>        );</a:t>
-            </a:r>
-          </a:p>
-          <a:p>
-            <a:pPr marL="0" indent="0">
-              <a:lnSpc>
-                <a:spcPct val="100000"/>
-              </a:lnSpc>
-              <a:spcBef>
-                <a:spcPct val="0"/>
-              </a:spcBef>
-              <a:spcAft>
-                <a:spcPct val="0"/>
-              </a:spcAft>
-              <a:buNone/>
-            </a:pPr>
-            <a:r>
-              <a:rPr lang="en-US" sz="1300" noProof="1" smtClean="0">
-                <a:solidFill>
-                  <a:schemeClr val="tx1">
-                    <a:lumMod val="85000"/>
-                    <a:lumOff val="15000"/>
-                  </a:schemeClr>
-                </a:solidFill>
-                <a:latin typeface="Inconsolata"/>
-              </a:rPr>
-              <a:t>      }, "json" );</a:t>
-            </a:r>
-          </a:p>
-          <a:p>
-            <a:pPr marL="0" indent="0">
-              <a:lnSpc>
-                <a:spcPct val="100000"/>
-              </a:lnSpc>
-              <a:spcBef>
-                <a:spcPct val="0"/>
-              </a:spcBef>
-              <a:spcAft>
-                <a:spcPct val="0"/>
-              </a:spcAft>
-              <a:buNone/>
-            </a:pPr>
-            <a:endParaRPr lang="en-US" sz="1300" noProof="1" smtClean="0">
-              <a:solidFill>
-                <a:schemeClr val="tx1">
-                  <a:lumMod val="85000"/>
-                  <a:lumOff val="15000"/>
-                </a:schemeClr>
-              </a:solidFill>
-              <a:latin typeface="Inconsolata"/>
-            </a:endParaRPr>
-          </a:p>
-          <a:p>
-            <a:pPr marL="0" indent="0">
-              <a:lnSpc>
-                <a:spcPct val="100000"/>
-              </a:lnSpc>
-              <a:spcBef>
-                <a:spcPct val="0"/>
-              </a:spcBef>
-              <a:spcAft>
-                <a:spcPct val="0"/>
-              </a:spcAft>
-              <a:buNone/>
-            </a:pPr>
-            <a:r>
-              <a:rPr lang="en-US" sz="1300" noProof="1" smtClean="0">
-                <a:solidFill>
-                  <a:schemeClr val="tx1">
-                    <a:lumMod val="85000"/>
-                    <a:lumOff val="15000"/>
-                  </a:schemeClr>
-                </a:solidFill>
-                <a:latin typeface="Inconsolata"/>
-              </a:rPr>
-              <a:t>    &lt;/script&gt;</a:t>
-            </a:r>
-          </a:p>
-          <a:p>
-            <a:pPr marL="0" indent="0">
-              <a:lnSpc>
-                <a:spcPct val="100000"/>
-              </a:lnSpc>
-              <a:spcBef>
-                <a:spcPct val="0"/>
-              </a:spcBef>
-              <a:spcAft>
-                <a:spcPct val="0"/>
-              </a:spcAft>
-              <a:buNone/>
-            </a:pPr>
-            <a:r>
-              <a:rPr lang="en-US" sz="1300" noProof="1" smtClean="0">
-                <a:solidFill>
-                  <a:schemeClr val="tx1">
-                    <a:lumMod val="85000"/>
-                    <a:lumOff val="15000"/>
-                  </a:schemeClr>
-                </a:solidFill>
-                <a:latin typeface="Inconsolata"/>
-              </a:rPr>
-              <a:t>  &lt;/head&gt;</a:t>
-            </a:r>
-          </a:p>
-          <a:p>
-            <a:pPr marL="0" indent="0">
-              <a:lnSpc>
-                <a:spcPct val="100000"/>
-              </a:lnSpc>
-              <a:spcBef>
-                <a:spcPct val="0"/>
-              </a:spcBef>
-              <a:spcAft>
-                <a:spcPct val="0"/>
-              </a:spcAft>
-              <a:buNone/>
-            </a:pPr>
-            <a:r>
-              <a:rPr lang="en-US" sz="1300" noProof="1" smtClean="0">
-                <a:solidFill>
-                  <a:schemeClr val="tx1">
-                    <a:lumMod val="85000"/>
-                    <a:lumOff val="15000"/>
-                  </a:schemeClr>
-                </a:solidFill>
-                <a:latin typeface="Inconsolata"/>
-              </a:rPr>
-              <a:t>  &lt;body&gt;&lt;/body&gt;</a:t>
-            </a:r>
-          </a:p>
-          <a:p>
-            <a:pPr marL="0" indent="0">
-              <a:lnSpc>
-                <a:spcPct val="100000"/>
-              </a:lnSpc>
-              <a:spcBef>
-                <a:spcPct val="0"/>
-              </a:spcBef>
-              <a:spcAft>
-                <a:spcPct val="0"/>
-              </a:spcAft>
-              <a:buNone/>
-            </a:pPr>
-            <a:r>
-              <a:rPr lang="en-US" sz="1300" noProof="1" smtClean="0">
-                <a:solidFill>
-                  <a:schemeClr val="tx1">
-                    <a:lumMod val="85000"/>
-                    <a:lumOff val="15000"/>
-                  </a:schemeClr>
-                </a:solidFill>
-                <a:latin typeface="Inconsolata"/>
-              </a:rPr>
-              <a:t>&lt;/html&gt;</a:t>
-            </a:r>
-          </a:p>
-        </p:txBody>
-      </p:sp>
-      <p:sp>
-        <p:nvSpPr>
-          <p:cNvPr id="15" name="Rectangle 14"/>
-          <p:cNvSpPr/>
-          <p:nvPr/>
-        </p:nvSpPr>
-        <p:spPr bwMode="auto">
-          <a:xfrm>
-            <a:off x="821532" y="651868"/>
-            <a:ext cx="7905006" cy="1466701"/>
-          </a:xfrm>
-          <a:prstGeom prst="rect">
-            <a:avLst/>
-          </a:prstGeom>
-          <a:solidFill>
-            <a:schemeClr val="bg2">
-              <a:lumMod val="40000"/>
-              <a:lumOff val="60000"/>
-              <a:alpha val="60000"/>
-            </a:schemeClr>
-          </a:solidFill>
-          <a:ln w="25400" cap="flat" cmpd="sng" algn="ctr">
-            <a:noFill/>
-            <a:prstDash val="solid"/>
-            <a:round/>
-            <a:headEnd type="none" w="med" len="med"/>
-            <a:tailEnd type="none" w="med" len="med"/>
-          </a:ln>
-          <a:effectLst/>
-        </p:spPr>
-        <p:txBody>
-          <a:bodyPr lIns="64291" tIns="32146" rIns="64291" bIns="32146">
-            <a:prstTxWarp prst="textNoShape">
-              <a:avLst/>
-            </a:prstTxWarp>
-          </a:bodyPr>
-          <a:lstStyle/>
-          <a:p>
-            <a:pPr>
-              <a:defRPr/>
-            </a:pPr>
-            <a:endParaRPr lang="en-US"/>
-          </a:p>
-        </p:txBody>
-      </p:sp>
-      <p:sp>
-        <p:nvSpPr>
-          <p:cNvPr id="16" name="Rectangle 15"/>
-          <p:cNvSpPr/>
-          <p:nvPr/>
-        </p:nvSpPr>
-        <p:spPr bwMode="auto">
-          <a:xfrm>
             <a:off x="821531" y="4648200"/>
             <a:ext cx="7905006" cy="840506"/>
           </a:xfrm>
@@ -14263,1571 +12831,7 @@
 </p:sld>
 </file>
 
-<file path=ppt/slides/slide23.xml><?xml version="1.0" encoding="utf-8"?>
-<p:sld xmlns:a="http://schemas.openxmlformats.org/drawingml/2006/main" xmlns:r="http://schemas.openxmlformats.org/officeDocument/2006/relationships" xmlns:mc="http://schemas.openxmlformats.org/markup-compatibility/2006" xmlns:mv="urn:schemas-microsoft-com:mac:vml" xmlns:p="http://schemas.openxmlformats.org/presentationml/2006/main" mc:Ignorable="mv" mc:PreserveAttributes="mv:*">
-  <p:cSld>
-    <p:spTree>
-      <p:nvGrpSpPr>
-        <p:cNvPr id="1" name=""/>
-        <p:cNvGrpSpPr/>
-        <p:nvPr/>
-      </p:nvGrpSpPr>
-      <p:grpSpPr>
-        <a:xfrm>
-          <a:off x="0" y="0"/>
-          <a:ext cx="0" cy="0"/>
-          <a:chOff x="0" y="0"/>
-          <a:chExt cx="0" cy="0"/>
-        </a:xfrm>
-      </p:grpSpPr>
-      <p:sp>
-        <p:nvSpPr>
-          <p:cNvPr id="13" name="Content Placeholder 10"/>
-          <p:cNvSpPr txBox="1">
-            <a:spLocks/>
-          </p:cNvSpPr>
-          <p:nvPr/>
-        </p:nvSpPr>
-        <p:spPr bwMode="auto">
-          <a:xfrm>
-            <a:off x="339328" y="651866"/>
-            <a:ext cx="482203" cy="5023107"/>
-          </a:xfrm>
-          <a:prstGeom prst="rect">
-            <a:avLst/>
-          </a:prstGeom>
-          <a:noFill/>
-          <a:ln w="12700">
-            <a:noFill/>
-            <a:miter lim="800000"/>
-            <a:headEnd/>
-            <a:tailEnd/>
-          </a:ln>
-        </p:spPr>
-        <p:txBody>
-          <a:bodyPr lIns="0" tIns="35717" rIns="128583" bIns="35717">
-            <a:prstTxWarp prst="textNoShape">
-              <a:avLst/>
-            </a:prstTxWarp>
-          </a:bodyPr>
-          <a:lstStyle/>
-          <a:p>
-            <a:pPr algn="r" eaLnBrk="0" hangingPunct="0">
-              <a:spcBef>
-                <a:spcPts val="0"/>
-              </a:spcBef>
-              <a:spcAft>
-                <a:spcPts val="0"/>
-              </a:spcAft>
-              <a:buClr>
-                <a:srgbClr val="FF7A24"/>
-              </a:buClr>
-              <a:buSzPct val="100000"/>
-              <a:defRPr/>
-            </a:pPr>
-            <a:endParaRPr lang="en-US" sz="1300" kern="0" dirty="0">
-              <a:solidFill>
-                <a:schemeClr val="tx1">
-                  <a:lumMod val="85000"/>
-                  <a:lumOff val="15000"/>
-                </a:schemeClr>
-              </a:solidFill>
-              <a:latin typeface="Inconsolata"/>
-              <a:ea typeface="+mn-ea"/>
-              <a:cs typeface="+mn-cs"/>
-              <a:sym typeface="Arial" charset="0"/>
-            </a:endParaRPr>
-          </a:p>
-          <a:p>
-            <a:pPr algn="r" eaLnBrk="0" hangingPunct="0">
-              <a:spcBef>
-                <a:spcPts val="0"/>
-              </a:spcBef>
-              <a:spcAft>
-                <a:spcPts val="0"/>
-              </a:spcAft>
-              <a:buClr>
-                <a:srgbClr val="FF7A24"/>
-              </a:buClr>
-              <a:buSzPct val="100000"/>
-              <a:defRPr/>
-            </a:pPr>
-            <a:endParaRPr lang="en-US" sz="1300" kern="0" dirty="0">
-              <a:solidFill>
-                <a:schemeClr val="tx1">
-                  <a:lumMod val="85000"/>
-                  <a:lumOff val="15000"/>
-                </a:schemeClr>
-              </a:solidFill>
-              <a:latin typeface="Inconsolata"/>
-              <a:ea typeface="+mn-ea"/>
-              <a:cs typeface="+mn-cs"/>
-              <a:sym typeface="Arial" charset="0"/>
-            </a:endParaRPr>
-          </a:p>
-          <a:p>
-            <a:pPr algn="r" eaLnBrk="0" hangingPunct="0">
-              <a:spcBef>
-                <a:spcPts val="0"/>
-              </a:spcBef>
-              <a:spcAft>
-                <a:spcPts val="0"/>
-              </a:spcAft>
-              <a:buClr>
-                <a:srgbClr val="FF7A24"/>
-              </a:buClr>
-              <a:buSzPct val="100000"/>
-              <a:defRPr/>
-            </a:pPr>
-            <a:endParaRPr lang="en-US" sz="1300" kern="0" dirty="0">
-              <a:solidFill>
-                <a:schemeClr val="tx1">
-                  <a:lumMod val="85000"/>
-                  <a:lumOff val="15000"/>
-                </a:schemeClr>
-              </a:solidFill>
-              <a:latin typeface="Inconsolata"/>
-              <a:ea typeface="+mn-ea"/>
-              <a:cs typeface="+mn-cs"/>
-              <a:sym typeface="Arial" charset="0"/>
-            </a:endParaRPr>
-          </a:p>
-          <a:p>
-            <a:pPr algn="r" eaLnBrk="0" hangingPunct="0">
-              <a:spcBef>
-                <a:spcPts val="0"/>
-              </a:spcBef>
-              <a:spcAft>
-                <a:spcPts val="0"/>
-              </a:spcAft>
-              <a:buClr>
-                <a:srgbClr val="FF7A24"/>
-              </a:buClr>
-              <a:buSzPct val="100000"/>
-              <a:defRPr/>
-            </a:pPr>
-            <a:endParaRPr lang="en-US" sz="1300" kern="0" dirty="0">
-              <a:solidFill>
-                <a:schemeClr val="tx1">
-                  <a:lumMod val="85000"/>
-                  <a:lumOff val="15000"/>
-                </a:schemeClr>
-              </a:solidFill>
-              <a:latin typeface="Inconsolata"/>
-              <a:ea typeface="+mn-ea"/>
-              <a:cs typeface="+mn-cs"/>
-              <a:sym typeface="Arial" charset="0"/>
-            </a:endParaRPr>
-          </a:p>
-          <a:p>
-            <a:pPr algn="r" eaLnBrk="0" hangingPunct="0">
-              <a:spcBef>
-                <a:spcPts val="0"/>
-              </a:spcBef>
-              <a:spcAft>
-                <a:spcPts val="0"/>
-              </a:spcAft>
-              <a:buClr>
-                <a:srgbClr val="FF7A24"/>
-              </a:buClr>
-              <a:buSzPct val="100000"/>
-              <a:defRPr/>
-            </a:pPr>
-            <a:endParaRPr lang="en-US" sz="1300" kern="0" dirty="0">
-              <a:solidFill>
-                <a:schemeClr val="tx1">
-                  <a:lumMod val="85000"/>
-                  <a:lumOff val="15000"/>
-                </a:schemeClr>
-              </a:solidFill>
-              <a:latin typeface="Inconsolata"/>
-              <a:ea typeface="+mn-ea"/>
-              <a:cs typeface="+mn-cs"/>
-              <a:sym typeface="Arial" charset="0"/>
-            </a:endParaRPr>
-          </a:p>
-          <a:p>
-            <a:pPr algn="r" eaLnBrk="0" hangingPunct="0">
-              <a:spcBef>
-                <a:spcPts val="0"/>
-              </a:spcBef>
-              <a:spcAft>
-                <a:spcPts val="0"/>
-              </a:spcAft>
-              <a:buClr>
-                <a:srgbClr val="FF7A24"/>
-              </a:buClr>
-              <a:buSzPct val="100000"/>
-              <a:defRPr/>
-            </a:pPr>
-            <a:endParaRPr lang="en-US" sz="1300" kern="0" dirty="0">
-              <a:solidFill>
-                <a:schemeClr val="tx1">
-                  <a:lumMod val="85000"/>
-                  <a:lumOff val="15000"/>
-                </a:schemeClr>
-              </a:solidFill>
-              <a:latin typeface="Inconsolata"/>
-              <a:ea typeface="+mn-ea"/>
-              <a:cs typeface="+mn-cs"/>
-              <a:sym typeface="Arial" charset="0"/>
-            </a:endParaRPr>
-          </a:p>
-          <a:p>
-            <a:pPr algn="r" eaLnBrk="0" hangingPunct="0">
-              <a:spcBef>
-                <a:spcPts val="0"/>
-              </a:spcBef>
-              <a:spcAft>
-                <a:spcPts val="0"/>
-              </a:spcAft>
-              <a:buClr>
-                <a:srgbClr val="FF7A24"/>
-              </a:buClr>
-              <a:buSzPct val="100000"/>
-              <a:defRPr/>
-            </a:pPr>
-            <a:endParaRPr lang="en-US" sz="1300" kern="0" dirty="0">
-              <a:solidFill>
-                <a:schemeClr val="tx1">
-                  <a:lumMod val="85000"/>
-                  <a:lumOff val="15000"/>
-                </a:schemeClr>
-              </a:solidFill>
-              <a:latin typeface="Inconsolata"/>
-              <a:ea typeface="+mn-ea"/>
-              <a:cs typeface="+mn-cs"/>
-              <a:sym typeface="Arial" charset="0"/>
-            </a:endParaRPr>
-          </a:p>
-          <a:p>
-            <a:pPr algn="r" eaLnBrk="0" hangingPunct="0">
-              <a:spcBef>
-                <a:spcPts val="0"/>
-              </a:spcBef>
-              <a:spcAft>
-                <a:spcPts val="0"/>
-              </a:spcAft>
-              <a:buClr>
-                <a:srgbClr val="FF7A24"/>
-              </a:buClr>
-              <a:buSzPct val="100000"/>
-              <a:defRPr/>
-            </a:pPr>
-            <a:endParaRPr lang="en-US" sz="1300" kern="0" dirty="0">
-              <a:solidFill>
-                <a:schemeClr val="tx1">
-                  <a:lumMod val="85000"/>
-                  <a:lumOff val="15000"/>
-                </a:schemeClr>
-              </a:solidFill>
-              <a:latin typeface="Inconsolata"/>
-              <a:ea typeface="+mn-ea"/>
-              <a:cs typeface="+mn-cs"/>
-              <a:sym typeface="Arial" charset="0"/>
-            </a:endParaRPr>
-          </a:p>
-          <a:p>
-            <a:pPr algn="r" eaLnBrk="0" hangingPunct="0">
-              <a:spcBef>
-                <a:spcPts val="0"/>
-              </a:spcBef>
-              <a:spcAft>
-                <a:spcPts val="0"/>
-              </a:spcAft>
-              <a:buClr>
-                <a:srgbClr val="FF7A24"/>
-              </a:buClr>
-              <a:buSzPct val="100000"/>
-              <a:defRPr/>
-            </a:pPr>
-            <a:r>
-              <a:rPr lang="en-US" sz="1300" kern="0" dirty="0">
-                <a:solidFill>
-                  <a:schemeClr val="tx1">
-                    <a:lumMod val="85000"/>
-                    <a:lumOff val="15000"/>
-                  </a:schemeClr>
-                </a:solidFill>
-                <a:latin typeface="Inconsolata"/>
-                <a:ea typeface="+mn-ea"/>
-                <a:cs typeface="+mn-cs"/>
-                <a:sym typeface="Arial" charset="0"/>
-              </a:rPr>
-              <a:t>1</a:t>
-            </a:r>
-          </a:p>
-          <a:p>
-            <a:pPr algn="r" eaLnBrk="0" hangingPunct="0">
-              <a:spcBef>
-                <a:spcPts val="0"/>
-              </a:spcBef>
-              <a:spcAft>
-                <a:spcPts val="0"/>
-              </a:spcAft>
-              <a:buClr>
-                <a:srgbClr val="FF7A24"/>
-              </a:buClr>
-              <a:buSzPct val="100000"/>
-              <a:defRPr/>
-            </a:pPr>
-            <a:r>
-              <a:rPr lang="en-US" sz="1300" kern="0" dirty="0">
-                <a:solidFill>
-                  <a:schemeClr val="tx1">
-                    <a:lumMod val="85000"/>
-                    <a:lumOff val="15000"/>
-                  </a:schemeClr>
-                </a:solidFill>
-                <a:latin typeface="Inconsolata"/>
-                <a:ea typeface="+mn-ea"/>
-                <a:cs typeface="+mn-cs"/>
-                <a:sym typeface="Arial" charset="0"/>
-              </a:rPr>
-              <a:t>2</a:t>
-            </a:r>
-          </a:p>
-          <a:p>
-            <a:pPr algn="r" eaLnBrk="0" hangingPunct="0">
-              <a:spcBef>
-                <a:spcPts val="0"/>
-              </a:spcBef>
-              <a:spcAft>
-                <a:spcPts val="0"/>
-              </a:spcAft>
-              <a:buClr>
-                <a:srgbClr val="FF7A24"/>
-              </a:buClr>
-              <a:buSzPct val="100000"/>
-              <a:defRPr/>
-            </a:pPr>
-            <a:r>
-              <a:rPr lang="en-US" sz="1300" kern="0" dirty="0">
-                <a:solidFill>
-                  <a:schemeClr val="tx1">
-                    <a:lumMod val="85000"/>
-                    <a:lumOff val="15000"/>
-                  </a:schemeClr>
-                </a:solidFill>
-                <a:latin typeface="Inconsolata"/>
-                <a:ea typeface="+mn-ea"/>
-                <a:cs typeface="+mn-cs"/>
-                <a:sym typeface="Arial" charset="0"/>
-              </a:rPr>
-              <a:t>3</a:t>
-            </a:r>
-          </a:p>
-          <a:p>
-            <a:pPr algn="r" eaLnBrk="0" hangingPunct="0">
-              <a:spcBef>
-                <a:spcPts val="0"/>
-              </a:spcBef>
-              <a:spcAft>
-                <a:spcPts val="0"/>
-              </a:spcAft>
-              <a:buClr>
-                <a:srgbClr val="FF7A24"/>
-              </a:buClr>
-              <a:buSzPct val="100000"/>
-              <a:defRPr/>
-            </a:pPr>
-            <a:r>
-              <a:rPr lang="en-US" sz="1300" kern="0" dirty="0">
-                <a:solidFill>
-                  <a:schemeClr val="tx1">
-                    <a:lumMod val="85000"/>
-                    <a:lumOff val="15000"/>
-                  </a:schemeClr>
-                </a:solidFill>
-                <a:latin typeface="Inconsolata"/>
-                <a:ea typeface="+mn-ea"/>
-                <a:cs typeface="+mn-cs"/>
-                <a:sym typeface="Arial" charset="0"/>
-              </a:rPr>
-              <a:t>4</a:t>
-            </a:r>
-          </a:p>
-          <a:p>
-            <a:pPr algn="r" eaLnBrk="0" hangingPunct="0">
-              <a:spcBef>
-                <a:spcPts val="0"/>
-              </a:spcBef>
-              <a:spcAft>
-                <a:spcPts val="0"/>
-              </a:spcAft>
-              <a:buClr>
-                <a:srgbClr val="FF7A24"/>
-              </a:buClr>
-              <a:buSzPct val="100000"/>
-              <a:defRPr/>
-            </a:pPr>
-            <a:r>
-              <a:rPr lang="en-US" sz="1300" kern="0" dirty="0">
-                <a:solidFill>
-                  <a:schemeClr val="tx1">
-                    <a:lumMod val="85000"/>
-                    <a:lumOff val="15000"/>
-                  </a:schemeClr>
-                </a:solidFill>
-                <a:latin typeface="Inconsolata"/>
-                <a:ea typeface="+mn-ea"/>
-                <a:cs typeface="+mn-cs"/>
-                <a:sym typeface="Arial" charset="0"/>
-              </a:rPr>
-              <a:t>5</a:t>
-            </a:r>
-          </a:p>
-          <a:p>
-            <a:pPr algn="r" eaLnBrk="0" hangingPunct="0">
-              <a:spcBef>
-                <a:spcPts val="0"/>
-              </a:spcBef>
-              <a:spcAft>
-                <a:spcPts val="0"/>
-              </a:spcAft>
-              <a:buClr>
-                <a:srgbClr val="FF7A24"/>
-              </a:buClr>
-              <a:buSzPct val="100000"/>
-              <a:defRPr/>
-            </a:pPr>
-            <a:r>
-              <a:rPr lang="en-US" sz="1300" kern="0" dirty="0">
-                <a:solidFill>
-                  <a:schemeClr val="tx1">
-                    <a:lumMod val="85000"/>
-                    <a:lumOff val="15000"/>
-                  </a:schemeClr>
-                </a:solidFill>
-                <a:latin typeface="Inconsolata"/>
-                <a:ea typeface="+mn-ea"/>
-                <a:cs typeface="+mn-cs"/>
-                <a:sym typeface="Arial" charset="0"/>
-              </a:rPr>
-              <a:t>6</a:t>
-            </a:r>
-          </a:p>
-          <a:p>
-            <a:pPr algn="r" eaLnBrk="0" hangingPunct="0">
-              <a:spcBef>
-                <a:spcPts val="0"/>
-              </a:spcBef>
-              <a:spcAft>
-                <a:spcPts val="0"/>
-              </a:spcAft>
-              <a:buClr>
-                <a:srgbClr val="FF7A24"/>
-              </a:buClr>
-              <a:buSzPct val="100000"/>
-              <a:defRPr/>
-            </a:pPr>
-            <a:r>
-              <a:rPr lang="en-US" sz="1300" kern="0" dirty="0">
-                <a:solidFill>
-                  <a:schemeClr val="tx1">
-                    <a:lumMod val="85000"/>
-                    <a:lumOff val="15000"/>
-                  </a:schemeClr>
-                </a:solidFill>
-                <a:latin typeface="Inconsolata"/>
-                <a:ea typeface="+mn-ea"/>
-                <a:cs typeface="+mn-cs"/>
-                <a:sym typeface="Arial" charset="0"/>
-              </a:rPr>
-              <a:t>7</a:t>
-            </a:r>
-          </a:p>
-          <a:p>
-            <a:pPr algn="r" eaLnBrk="0" hangingPunct="0">
-              <a:spcBef>
-                <a:spcPts val="0"/>
-              </a:spcBef>
-              <a:spcAft>
-                <a:spcPts val="0"/>
-              </a:spcAft>
-              <a:buClr>
-                <a:srgbClr val="FF7A24"/>
-              </a:buClr>
-              <a:buSzPct val="100000"/>
-              <a:defRPr/>
-            </a:pPr>
-            <a:r>
-              <a:rPr lang="en-US" sz="1300" kern="0" dirty="0">
-                <a:solidFill>
-                  <a:schemeClr val="tx1">
-                    <a:lumMod val="85000"/>
-                    <a:lumOff val="15000"/>
-                  </a:schemeClr>
-                </a:solidFill>
-                <a:latin typeface="Inconsolata"/>
-                <a:ea typeface="+mn-ea"/>
-                <a:cs typeface="+mn-cs"/>
-                <a:sym typeface="Arial" charset="0"/>
-              </a:rPr>
-              <a:t>8</a:t>
-            </a:r>
-          </a:p>
-          <a:p>
-            <a:pPr algn="r" eaLnBrk="0" hangingPunct="0">
-              <a:spcBef>
-                <a:spcPts val="0"/>
-              </a:spcBef>
-              <a:spcAft>
-                <a:spcPts val="0"/>
-              </a:spcAft>
-              <a:buClr>
-                <a:srgbClr val="FF7A24"/>
-              </a:buClr>
-              <a:buSzPct val="100000"/>
-              <a:defRPr/>
-            </a:pPr>
-            <a:r>
-              <a:rPr lang="en-US" sz="1300" kern="0" dirty="0">
-                <a:solidFill>
-                  <a:schemeClr val="tx1">
-                    <a:lumMod val="85000"/>
-                    <a:lumOff val="15000"/>
-                  </a:schemeClr>
-                </a:solidFill>
-                <a:latin typeface="Inconsolata"/>
-                <a:ea typeface="+mn-ea"/>
-                <a:cs typeface="+mn-cs"/>
-                <a:sym typeface="Arial" charset="0"/>
-              </a:rPr>
-              <a:t>9</a:t>
-            </a:r>
-          </a:p>
-          <a:p>
-            <a:pPr algn="r" eaLnBrk="0" hangingPunct="0">
-              <a:spcBef>
-                <a:spcPts val="0"/>
-              </a:spcBef>
-              <a:spcAft>
-                <a:spcPts val="0"/>
-              </a:spcAft>
-              <a:buClr>
-                <a:srgbClr val="FF7A24"/>
-              </a:buClr>
-              <a:buSzPct val="100000"/>
-              <a:defRPr/>
-            </a:pPr>
-            <a:r>
-              <a:rPr lang="en-US" sz="1300" kern="0" dirty="0">
-                <a:solidFill>
-                  <a:schemeClr val="tx1">
-                    <a:lumMod val="85000"/>
-                    <a:lumOff val="15000"/>
-                  </a:schemeClr>
-                </a:solidFill>
-                <a:latin typeface="Inconsolata"/>
-                <a:ea typeface="+mn-ea"/>
-                <a:cs typeface="+mn-cs"/>
-                <a:sym typeface="Arial" charset="0"/>
-              </a:rPr>
-              <a:t>10</a:t>
-            </a:r>
-          </a:p>
-          <a:p>
-            <a:pPr algn="r" eaLnBrk="0" hangingPunct="0">
-              <a:spcBef>
-                <a:spcPts val="0"/>
-              </a:spcBef>
-              <a:spcAft>
-                <a:spcPts val="0"/>
-              </a:spcAft>
-              <a:buClr>
-                <a:srgbClr val="FF7A24"/>
-              </a:buClr>
-              <a:buSzPct val="100000"/>
-              <a:defRPr/>
-            </a:pPr>
-            <a:r>
-              <a:rPr lang="en-US" sz="1300" kern="0" dirty="0" smtClean="0">
-                <a:solidFill>
-                  <a:schemeClr val="tx1">
-                    <a:lumMod val="85000"/>
-                    <a:lumOff val="15000"/>
-                  </a:schemeClr>
-                </a:solidFill>
-                <a:latin typeface="Inconsolata"/>
-                <a:ea typeface="+mn-ea"/>
-                <a:cs typeface="+mn-cs"/>
-                <a:sym typeface="Arial" charset="0"/>
-              </a:rPr>
-              <a:t>11</a:t>
-            </a:r>
-          </a:p>
-        </p:txBody>
-      </p:sp>
-      <p:sp>
-        <p:nvSpPr>
-          <p:cNvPr id="51203" name="Title 9"/>
-          <p:cNvSpPr>
-            <a:spLocks noGrp="1"/>
-          </p:cNvSpPr>
-          <p:nvPr>
-            <p:ph type="title"/>
-          </p:nvPr>
-        </p:nvSpPr>
-        <p:spPr/>
-        <p:txBody>
-          <a:bodyPr/>
-          <a:lstStyle/>
-          <a:p>
-            <a:r>
-              <a:rPr lang="en-US" dirty="0" smtClean="0">
-                <a:latin typeface="Arial Rounded MT Bold" charset="0"/>
-              </a:rPr>
-              <a:t>JavaScript example</a:t>
-            </a:r>
-          </a:p>
-        </p:txBody>
-      </p:sp>
-      <p:sp>
-        <p:nvSpPr>
-          <p:cNvPr id="51204" name="Content Placeholder 10"/>
-          <p:cNvSpPr>
-            <a:spLocks noGrp="1"/>
-          </p:cNvSpPr>
-          <p:nvPr>
-            <p:ph idx="1"/>
-          </p:nvPr>
-        </p:nvSpPr>
-        <p:spPr>
-          <a:xfrm>
-            <a:off x="982266" y="651866"/>
-            <a:ext cx="7744271" cy="5023107"/>
-          </a:xfrm>
-        </p:spPr>
-        <p:txBody>
-          <a:bodyPr>
-            <a:noAutofit/>
-          </a:bodyPr>
-          <a:lstStyle/>
-          <a:p>
-            <a:pPr marL="0" indent="0">
-              <a:lnSpc>
-                <a:spcPct val="100000"/>
-              </a:lnSpc>
-              <a:spcBef>
-                <a:spcPct val="0"/>
-              </a:spcBef>
-              <a:spcAft>
-                <a:spcPct val="0"/>
-              </a:spcAft>
-              <a:buNone/>
-            </a:pPr>
-            <a:r>
-              <a:rPr lang="en-US" sz="1300" noProof="1" smtClean="0">
-                <a:solidFill>
-                  <a:schemeClr val="tx1">
-                    <a:lumMod val="85000"/>
-                    <a:lumOff val="15000"/>
-                  </a:schemeClr>
-                </a:solidFill>
-                <a:latin typeface="Inconsolata"/>
-              </a:rPr>
-              <a:t>&lt;!DOCTYPE html PUBLIC "-//W3C//DTD XHTML 1.0 Strict//EN”</a:t>
-            </a:r>
-          </a:p>
-          <a:p>
-            <a:pPr marL="0" indent="0">
-              <a:lnSpc>
-                <a:spcPct val="100000"/>
-              </a:lnSpc>
-              <a:spcBef>
-                <a:spcPct val="0"/>
-              </a:spcBef>
-              <a:spcAft>
-                <a:spcPct val="0"/>
-              </a:spcAft>
-              <a:buNone/>
-            </a:pPr>
-            <a:r>
-              <a:rPr lang="en-US" sz="1300" noProof="1" smtClean="0">
-                <a:solidFill>
-                  <a:schemeClr val="tx1">
-                    <a:lumMod val="85000"/>
-                    <a:lumOff val="15000"/>
-                  </a:schemeClr>
-                </a:solidFill>
-                <a:latin typeface="Inconsolata"/>
-              </a:rPr>
-              <a:t>    "http://www.w3.org/TR/xhtml1/DTD/xhtml1-strict.dtd"&gt;</a:t>
-            </a:r>
-          </a:p>
-          <a:p>
-            <a:pPr marL="0" indent="0">
-              <a:lnSpc>
-                <a:spcPct val="100000"/>
-              </a:lnSpc>
-              <a:spcBef>
-                <a:spcPct val="0"/>
-              </a:spcBef>
-              <a:spcAft>
-                <a:spcPct val="0"/>
-              </a:spcAft>
-              <a:buNone/>
-            </a:pPr>
-            <a:endParaRPr lang="en-US" sz="1300" noProof="1" smtClean="0">
-              <a:solidFill>
-                <a:schemeClr val="tx1">
-                  <a:lumMod val="85000"/>
-                  <a:lumOff val="15000"/>
-                </a:schemeClr>
-              </a:solidFill>
-              <a:latin typeface="Inconsolata"/>
-            </a:endParaRPr>
-          </a:p>
-          <a:p>
-            <a:pPr marL="0" indent="0">
-              <a:lnSpc>
-                <a:spcPct val="100000"/>
-              </a:lnSpc>
-              <a:spcBef>
-                <a:spcPct val="0"/>
-              </a:spcBef>
-              <a:spcAft>
-                <a:spcPct val="0"/>
-              </a:spcAft>
-              <a:buNone/>
-            </a:pPr>
-            <a:r>
-              <a:rPr lang="en-US" sz="1300" noProof="1" smtClean="0">
-                <a:solidFill>
-                  <a:schemeClr val="tx1">
-                    <a:lumMod val="85000"/>
-                    <a:lumOff val="15000"/>
-                  </a:schemeClr>
-                </a:solidFill>
-                <a:latin typeface="Inconsolata"/>
-              </a:rPr>
-              <a:t>&lt;html xmlns="http://www.w3.org/1999/xhtml" xml:lang="en" lang="en"&gt;</a:t>
-            </a:r>
-          </a:p>
-          <a:p>
-            <a:pPr marL="0" indent="0">
-              <a:lnSpc>
-                <a:spcPct val="100000"/>
-              </a:lnSpc>
-              <a:spcBef>
-                <a:spcPct val="0"/>
-              </a:spcBef>
-              <a:spcAft>
-                <a:spcPct val="0"/>
-              </a:spcAft>
-              <a:buNone/>
-            </a:pPr>
-            <a:r>
-              <a:rPr lang="en-US" sz="1300" noProof="1" smtClean="0">
-                <a:solidFill>
-                  <a:schemeClr val="tx1">
-                    <a:lumMod val="85000"/>
-                    <a:lumOff val="15000"/>
-                  </a:schemeClr>
-                </a:solidFill>
-                <a:latin typeface="Inconsolata"/>
-              </a:rPr>
-              <a:t>  &lt;head&gt;</a:t>
-            </a:r>
-          </a:p>
-          <a:p>
-            <a:pPr marL="0" indent="0">
-              <a:lnSpc>
-                <a:spcPct val="100000"/>
-              </a:lnSpc>
-              <a:spcBef>
-                <a:spcPct val="0"/>
-              </a:spcBef>
-              <a:spcAft>
-                <a:spcPct val="0"/>
-              </a:spcAft>
-              <a:buNone/>
-            </a:pPr>
-            <a:r>
-              <a:rPr lang="en-US" sz="1300" noProof="1" smtClean="0">
-                <a:solidFill>
-                  <a:schemeClr val="tx1">
-                    <a:lumMod val="85000"/>
-                    <a:lumOff val="15000"/>
-                  </a:schemeClr>
-                </a:solidFill>
-                <a:latin typeface="Inconsolata"/>
-              </a:rPr>
-              <a:t>    &lt;script src="/dbrelay/js/jquery/jquery-1.4.2.min.js" &gt;&lt;/script&gt;</a:t>
-            </a:r>
-          </a:p>
-          <a:p>
-            <a:pPr marL="0" indent="0">
-              <a:lnSpc>
-                <a:spcPct val="100000"/>
-              </a:lnSpc>
-              <a:spcBef>
-                <a:spcPct val="0"/>
-              </a:spcBef>
-              <a:spcAft>
-                <a:spcPct val="0"/>
-              </a:spcAft>
-              <a:buNone/>
-            </a:pPr>
-            <a:r>
-              <a:rPr lang="en-US" sz="1300" noProof="1" smtClean="0">
-                <a:solidFill>
-                  <a:schemeClr val="tx1">
-                    <a:lumMod val="85000"/>
-                    <a:lumOff val="15000"/>
-                  </a:schemeClr>
-                </a:solidFill>
-                <a:latin typeface="Inconsolata"/>
-              </a:rPr>
-              <a:t>    &lt;script&gt;</a:t>
-            </a:r>
-          </a:p>
-          <a:p>
-            <a:pPr marL="0" indent="0">
-              <a:lnSpc>
-                <a:spcPct val="100000"/>
-              </a:lnSpc>
-              <a:spcBef>
-                <a:spcPct val="0"/>
-              </a:spcBef>
-              <a:spcAft>
-                <a:spcPct val="0"/>
-              </a:spcAft>
-              <a:buNone/>
-            </a:pPr>
-            <a:endParaRPr lang="en-US" sz="1300" noProof="1" smtClean="0">
-              <a:solidFill>
-                <a:schemeClr val="tx1">
-                  <a:lumMod val="85000"/>
-                  <a:lumOff val="15000"/>
-                </a:schemeClr>
-              </a:solidFill>
-              <a:latin typeface="Inconsolata"/>
-            </a:endParaRPr>
-          </a:p>
-          <a:p>
-            <a:pPr marL="0" indent="0">
-              <a:lnSpc>
-                <a:spcPct val="100000"/>
-              </a:lnSpc>
-              <a:spcBef>
-                <a:spcPct val="0"/>
-              </a:spcBef>
-              <a:spcAft>
-                <a:spcPct val="0"/>
-              </a:spcAft>
-              <a:buNone/>
-            </a:pPr>
-            <a:r>
-              <a:rPr lang="en-US" sz="1300" noProof="1" smtClean="0">
-                <a:solidFill>
-                  <a:schemeClr val="tx1">
-                    <a:lumMod val="85000"/>
-                    <a:lumOff val="15000"/>
-                  </a:schemeClr>
-                </a:solidFill>
-                <a:latin typeface="Inconsolata"/>
-              </a:rPr>
-              <a:t>     jQuery.post( "/sql", {</a:t>
-            </a:r>
-          </a:p>
-          <a:p>
-            <a:pPr marL="0" indent="0">
-              <a:lnSpc>
-                <a:spcPct val="100000"/>
-              </a:lnSpc>
-              <a:spcBef>
-                <a:spcPct val="0"/>
-              </a:spcBef>
-              <a:spcAft>
-                <a:spcPct val="0"/>
-              </a:spcAft>
-              <a:buNone/>
-            </a:pPr>
-            <a:r>
-              <a:rPr lang="en-US" sz="1300" noProof="1" smtClean="0">
-                <a:solidFill>
-                  <a:schemeClr val="tx1">
-                    <a:lumMod val="85000"/>
-                    <a:lumOff val="15000"/>
-                  </a:schemeClr>
-                </a:solidFill>
-                <a:latin typeface="Inconsolata"/>
-              </a:rPr>
-              <a:t>        connection_name : "dbrelay@oscon",</a:t>
-            </a:r>
-          </a:p>
-          <a:p>
-            <a:pPr marL="0" indent="0">
-              <a:lnSpc>
-                <a:spcPct val="100000"/>
-              </a:lnSpc>
-              <a:spcBef>
-                <a:spcPct val="0"/>
-              </a:spcBef>
-              <a:spcAft>
-                <a:spcPct val="0"/>
-              </a:spcAft>
-              <a:buNone/>
-            </a:pPr>
-            <a:r>
-              <a:rPr lang="en-US" sz="1300" noProof="1" smtClean="0">
-                <a:solidFill>
-                  <a:schemeClr val="tx1">
-                    <a:lumMod val="85000"/>
-                    <a:lumOff val="15000"/>
-                  </a:schemeClr>
-                </a:solidFill>
-                <a:latin typeface="Inconsolata"/>
-              </a:rPr>
-              <a:t>        sql_server      : "sqlserver",</a:t>
-            </a:r>
-          </a:p>
-          <a:p>
-            <a:pPr marL="0" indent="0">
-              <a:lnSpc>
-                <a:spcPct val="100000"/>
-              </a:lnSpc>
-              <a:spcBef>
-                <a:spcPct val="0"/>
-              </a:spcBef>
-              <a:spcAft>
-                <a:spcPct val="0"/>
-              </a:spcAft>
-              <a:buNone/>
-            </a:pPr>
-            <a:r>
-              <a:rPr lang="en-US" sz="1300" noProof="1" smtClean="0">
-                <a:solidFill>
-                  <a:schemeClr val="tx1">
-                    <a:lumMod val="85000"/>
-                    <a:lumOff val="15000"/>
-                  </a:schemeClr>
-                </a:solidFill>
-                <a:latin typeface="Inconsolata"/>
-              </a:rPr>
-              <a:t>        sql_user        : "demo",</a:t>
-            </a:r>
-          </a:p>
-          <a:p>
-            <a:pPr marL="0" indent="0">
-              <a:lnSpc>
-                <a:spcPct val="100000"/>
-              </a:lnSpc>
-              <a:spcBef>
-                <a:spcPct val="0"/>
-              </a:spcBef>
-              <a:spcAft>
-                <a:spcPct val="0"/>
-              </a:spcAft>
-              <a:buNone/>
-            </a:pPr>
-            <a:r>
-              <a:rPr lang="en-US" sz="1300" noProof="1" smtClean="0">
-                <a:solidFill>
-                  <a:schemeClr val="tx1">
-                    <a:lumMod val="85000"/>
-                    <a:lumOff val="15000"/>
-                  </a:schemeClr>
-                </a:solidFill>
-                <a:latin typeface="Inconsolata"/>
-              </a:rPr>
-              <a:t>        sql_password    : "demo",</a:t>
-            </a:r>
-          </a:p>
-          <a:p>
-            <a:pPr marL="0" indent="0">
-              <a:lnSpc>
-                <a:spcPct val="100000"/>
-              </a:lnSpc>
-              <a:spcBef>
-                <a:spcPct val="0"/>
-              </a:spcBef>
-              <a:spcAft>
-                <a:spcPct val="0"/>
-              </a:spcAft>
-              <a:buNone/>
-            </a:pPr>
-            <a:r>
-              <a:rPr lang="en-US" sz="1300" noProof="1" smtClean="0">
-                <a:solidFill>
-                  <a:schemeClr val="tx1">
-                    <a:lumMod val="85000"/>
-                    <a:lumOff val="15000"/>
-                  </a:schemeClr>
-                </a:solidFill>
-                <a:latin typeface="Inconsolata"/>
-              </a:rPr>
-              <a:t>        sql             : "select count(*) as employees from HumanResources.vEmployee"</a:t>
-            </a:r>
-          </a:p>
-          <a:p>
-            <a:pPr marL="0" indent="0">
-              <a:lnSpc>
-                <a:spcPct val="100000"/>
-              </a:lnSpc>
-              <a:spcBef>
-                <a:spcPct val="0"/>
-              </a:spcBef>
-              <a:spcAft>
-                <a:spcPct val="0"/>
-              </a:spcAft>
-              <a:buNone/>
-            </a:pPr>
-            <a:r>
-              <a:rPr lang="en-US" sz="1300" noProof="1" smtClean="0">
-                <a:solidFill>
-                  <a:schemeClr val="tx1">
-                    <a:lumMod val="85000"/>
-                    <a:lumOff val="15000"/>
-                  </a:schemeClr>
-                </a:solidFill>
-                <a:latin typeface="Inconsolata"/>
-              </a:rPr>
-              <a:t>      }, function( response ) {</a:t>
-            </a:r>
-          </a:p>
-          <a:p>
-            <a:pPr marL="0" indent="0">
-              <a:lnSpc>
-                <a:spcPct val="100000"/>
-              </a:lnSpc>
-              <a:spcBef>
-                <a:spcPct val="0"/>
-              </a:spcBef>
-              <a:spcAft>
-                <a:spcPct val="0"/>
-              </a:spcAft>
-              <a:buNone/>
-            </a:pPr>
-            <a:r>
-              <a:rPr lang="en-US" sz="1300" noProof="1" smtClean="0">
-                <a:solidFill>
-                  <a:schemeClr val="tx1">
-                    <a:lumMod val="85000"/>
-                    <a:lumOff val="15000"/>
-                  </a:schemeClr>
-                </a:solidFill>
-                <a:latin typeface="Inconsolata"/>
-              </a:rPr>
-              <a:t>        jQuery("body").html(</a:t>
-            </a:r>
-          </a:p>
-          <a:p>
-            <a:pPr marL="0" indent="0">
-              <a:lnSpc>
-                <a:spcPct val="100000"/>
-              </a:lnSpc>
-              <a:spcBef>
-                <a:spcPct val="0"/>
-              </a:spcBef>
-              <a:spcAft>
-                <a:spcPct val="0"/>
-              </a:spcAft>
-              <a:buNone/>
-            </a:pPr>
-            <a:r>
-              <a:rPr lang="en-US" sz="1300" noProof="1" smtClean="0">
-                <a:solidFill>
-                  <a:schemeClr val="tx1">
-                    <a:lumMod val="85000"/>
-                    <a:lumOff val="15000"/>
-                  </a:schemeClr>
-                </a:solidFill>
-                <a:latin typeface="Inconsolata"/>
-              </a:rPr>
-              <a:t>          "&lt;p&gt;" + response.data[0].rows[0].employees + " employees&lt;/p&gt;”</a:t>
-            </a:r>
-          </a:p>
-          <a:p>
-            <a:pPr marL="0" indent="0">
-              <a:lnSpc>
-                <a:spcPct val="100000"/>
-              </a:lnSpc>
-              <a:spcBef>
-                <a:spcPct val="0"/>
-              </a:spcBef>
-              <a:spcAft>
-                <a:spcPct val="0"/>
-              </a:spcAft>
-              <a:buNone/>
-            </a:pPr>
-            <a:r>
-              <a:rPr lang="en-US" sz="1300" noProof="1" smtClean="0">
-                <a:solidFill>
-                  <a:schemeClr val="tx1">
-                    <a:lumMod val="85000"/>
-                    <a:lumOff val="15000"/>
-                  </a:schemeClr>
-                </a:solidFill>
-                <a:latin typeface="Inconsolata"/>
-              </a:rPr>
-              <a:t>        );</a:t>
-            </a:r>
-          </a:p>
-          <a:p>
-            <a:pPr marL="0" indent="0">
-              <a:lnSpc>
-                <a:spcPct val="100000"/>
-              </a:lnSpc>
-              <a:spcBef>
-                <a:spcPct val="0"/>
-              </a:spcBef>
-              <a:spcAft>
-                <a:spcPct val="0"/>
-              </a:spcAft>
-              <a:buNone/>
-            </a:pPr>
-            <a:r>
-              <a:rPr lang="en-US" sz="1300" noProof="1" smtClean="0">
-                <a:solidFill>
-                  <a:schemeClr val="tx1">
-                    <a:lumMod val="85000"/>
-                    <a:lumOff val="15000"/>
-                  </a:schemeClr>
-                </a:solidFill>
-                <a:latin typeface="Inconsolata"/>
-              </a:rPr>
-              <a:t>      }, "json" );</a:t>
-            </a:r>
-          </a:p>
-          <a:p>
-            <a:pPr marL="0" indent="0">
-              <a:lnSpc>
-                <a:spcPct val="100000"/>
-              </a:lnSpc>
-              <a:spcBef>
-                <a:spcPct val="0"/>
-              </a:spcBef>
-              <a:spcAft>
-                <a:spcPct val="0"/>
-              </a:spcAft>
-              <a:buNone/>
-            </a:pPr>
-            <a:endParaRPr lang="en-US" sz="1300" noProof="1" smtClean="0">
-              <a:solidFill>
-                <a:schemeClr val="tx1">
-                  <a:lumMod val="85000"/>
-                  <a:lumOff val="15000"/>
-                </a:schemeClr>
-              </a:solidFill>
-              <a:latin typeface="Inconsolata"/>
-            </a:endParaRPr>
-          </a:p>
-          <a:p>
-            <a:pPr marL="0" indent="0">
-              <a:lnSpc>
-                <a:spcPct val="100000"/>
-              </a:lnSpc>
-              <a:spcBef>
-                <a:spcPct val="0"/>
-              </a:spcBef>
-              <a:spcAft>
-                <a:spcPct val="0"/>
-              </a:spcAft>
-              <a:buNone/>
-            </a:pPr>
-            <a:r>
-              <a:rPr lang="en-US" sz="1300" noProof="1" smtClean="0">
-                <a:solidFill>
-                  <a:schemeClr val="tx1">
-                    <a:lumMod val="85000"/>
-                    <a:lumOff val="15000"/>
-                  </a:schemeClr>
-                </a:solidFill>
-                <a:latin typeface="Inconsolata"/>
-              </a:rPr>
-              <a:t>    &lt;/script&gt;</a:t>
-            </a:r>
-          </a:p>
-          <a:p>
-            <a:pPr marL="0" indent="0">
-              <a:lnSpc>
-                <a:spcPct val="100000"/>
-              </a:lnSpc>
-              <a:spcBef>
-                <a:spcPct val="0"/>
-              </a:spcBef>
-              <a:spcAft>
-                <a:spcPct val="0"/>
-              </a:spcAft>
-              <a:buNone/>
-            </a:pPr>
-            <a:r>
-              <a:rPr lang="en-US" sz="1300" noProof="1" smtClean="0">
-                <a:solidFill>
-                  <a:schemeClr val="tx1">
-                    <a:lumMod val="85000"/>
-                    <a:lumOff val="15000"/>
-                  </a:schemeClr>
-                </a:solidFill>
-                <a:latin typeface="Inconsolata"/>
-              </a:rPr>
-              <a:t>  &lt;/head&gt;</a:t>
-            </a:r>
-          </a:p>
-          <a:p>
-            <a:pPr marL="0" indent="0">
-              <a:lnSpc>
-                <a:spcPct val="100000"/>
-              </a:lnSpc>
-              <a:spcBef>
-                <a:spcPct val="0"/>
-              </a:spcBef>
-              <a:spcAft>
-                <a:spcPct val="0"/>
-              </a:spcAft>
-              <a:buNone/>
-            </a:pPr>
-            <a:r>
-              <a:rPr lang="en-US" sz="1300" noProof="1" smtClean="0">
-                <a:solidFill>
-                  <a:schemeClr val="tx1">
-                    <a:lumMod val="85000"/>
-                    <a:lumOff val="15000"/>
-                  </a:schemeClr>
-                </a:solidFill>
-                <a:latin typeface="Inconsolata"/>
-              </a:rPr>
-              <a:t>  &lt;body&gt;&lt;/body&gt;</a:t>
-            </a:r>
-          </a:p>
-          <a:p>
-            <a:pPr marL="0" indent="0">
-              <a:lnSpc>
-                <a:spcPct val="100000"/>
-              </a:lnSpc>
-              <a:spcBef>
-                <a:spcPct val="0"/>
-              </a:spcBef>
-              <a:spcAft>
-                <a:spcPct val="0"/>
-              </a:spcAft>
-              <a:buNone/>
-            </a:pPr>
-            <a:r>
-              <a:rPr lang="en-US" sz="1300" noProof="1" smtClean="0">
-                <a:solidFill>
-                  <a:schemeClr val="tx1">
-                    <a:lumMod val="85000"/>
-                    <a:lumOff val="15000"/>
-                  </a:schemeClr>
-                </a:solidFill>
-                <a:latin typeface="Inconsolata"/>
-              </a:rPr>
-              <a:t>&lt;/html&gt;</a:t>
-            </a:r>
-          </a:p>
-        </p:txBody>
-      </p:sp>
-      <p:sp>
-        <p:nvSpPr>
-          <p:cNvPr id="15" name="Rectangle 14"/>
-          <p:cNvSpPr/>
-          <p:nvPr/>
-        </p:nvSpPr>
-        <p:spPr bwMode="auto">
-          <a:xfrm>
-            <a:off x="821532" y="651868"/>
-            <a:ext cx="7905006" cy="1466701"/>
-          </a:xfrm>
-          <a:prstGeom prst="rect">
-            <a:avLst/>
-          </a:prstGeom>
-          <a:solidFill>
-            <a:schemeClr val="bg2">
-              <a:lumMod val="40000"/>
-              <a:lumOff val="60000"/>
-              <a:alpha val="60000"/>
-            </a:schemeClr>
-          </a:solidFill>
-          <a:ln w="25400" cap="flat" cmpd="sng" algn="ctr">
-            <a:noFill/>
-            <a:prstDash val="solid"/>
-            <a:round/>
-            <a:headEnd type="none" w="med" len="med"/>
-            <a:tailEnd type="none" w="med" len="med"/>
-          </a:ln>
-          <a:effectLst/>
-        </p:spPr>
-        <p:txBody>
-          <a:bodyPr lIns="64291" tIns="32146" rIns="64291" bIns="32146">
-            <a:prstTxWarp prst="textNoShape">
-              <a:avLst/>
-            </a:prstTxWarp>
-          </a:bodyPr>
-          <a:lstStyle/>
-          <a:p>
-            <a:pPr>
-              <a:defRPr/>
-            </a:pPr>
-            <a:endParaRPr lang="en-US"/>
-          </a:p>
-        </p:txBody>
-      </p:sp>
-      <p:sp>
-        <p:nvSpPr>
-          <p:cNvPr id="16" name="Rectangle 15"/>
-          <p:cNvSpPr/>
-          <p:nvPr/>
-        </p:nvSpPr>
-        <p:spPr bwMode="auto">
-          <a:xfrm>
-            <a:off x="821531" y="4645894"/>
-            <a:ext cx="7905006" cy="840506"/>
-          </a:xfrm>
-          <a:prstGeom prst="rect">
-            <a:avLst/>
-          </a:prstGeom>
-          <a:solidFill>
-            <a:schemeClr val="bg2">
-              <a:lumMod val="40000"/>
-              <a:lumOff val="60000"/>
-              <a:alpha val="60000"/>
-            </a:schemeClr>
-          </a:solidFill>
-          <a:ln w="25400" cap="flat" cmpd="sng" algn="ctr">
-            <a:noFill/>
-            <a:prstDash val="solid"/>
-            <a:round/>
-            <a:headEnd type="none" w="med" len="med"/>
-            <a:tailEnd type="none" w="med" len="med"/>
-          </a:ln>
-          <a:effectLst/>
-        </p:spPr>
-        <p:txBody>
-          <a:bodyPr lIns="64291" tIns="32146" rIns="64291" bIns="32146">
-            <a:prstTxWarp prst="textNoShape">
-              <a:avLst/>
-            </a:prstTxWarp>
-          </a:bodyPr>
-          <a:lstStyle/>
-          <a:p>
-            <a:pPr>
-              <a:defRPr/>
-            </a:pPr>
-            <a:endParaRPr lang="en-US"/>
-          </a:p>
-        </p:txBody>
-      </p:sp>
-      <p:sp>
-        <p:nvSpPr>
-          <p:cNvPr id="7" name="Title 9"/>
-          <p:cNvSpPr txBox="1">
-            <a:spLocks/>
-          </p:cNvSpPr>
-          <p:nvPr/>
-        </p:nvSpPr>
-        <p:spPr bwMode="auto">
-          <a:xfrm>
-            <a:off x="2368387" y="3274317"/>
-            <a:ext cx="6358151" cy="2400657"/>
-          </a:xfrm>
-          <a:prstGeom prst="rect">
-            <a:avLst/>
-          </a:prstGeom>
-          <a:gradFill flip="none" rotWithShape="1">
-            <a:gsLst>
-              <a:gs pos="0">
-                <a:schemeClr val="bg1">
-                  <a:alpha val="0"/>
-                </a:schemeClr>
-              </a:gs>
-              <a:gs pos="40000">
-                <a:schemeClr val="bg1"/>
-              </a:gs>
-            </a:gsLst>
-            <a:lin ang="0" scaled="1"/>
-            <a:tileRect/>
-          </a:gradFill>
-          <a:ln w="12700">
-            <a:noFill/>
-            <a:miter lim="800000"/>
-            <a:headEnd/>
-            <a:tailEnd/>
-          </a:ln>
-        </p:spPr>
-        <p:txBody>
-          <a:bodyPr vert="horz" wrap="none" lIns="182880" tIns="182880" rIns="182880" bIns="182880" numCol="1" anchor="ctr" anchorCtr="0" compatLnSpc="1">
-            <a:prstTxWarp prst="textNoShape">
-              <a:avLst/>
-            </a:prstTxWarp>
-            <a:spAutoFit/>
-          </a:bodyPr>
-          <a:lstStyle/>
-          <a:p>
-            <a:pPr marL="0" marR="0" lvl="0" indent="0" algn="r" defTabSz="914400" rtl="0" eaLnBrk="0" fontAlgn="base" latinLnBrk="0" hangingPunct="0">
-              <a:lnSpc>
-                <a:spcPct val="100000"/>
-              </a:lnSpc>
-              <a:spcBef>
-                <a:spcPct val="0"/>
-              </a:spcBef>
-              <a:spcAft>
-                <a:spcPct val="0"/>
-              </a:spcAft>
-              <a:buClrTx/>
-              <a:buSzTx/>
-              <a:buFontTx/>
-              <a:buNone/>
-              <a:tabLst/>
-              <a:defRPr/>
-            </a:pPr>
-            <a:r>
-              <a:rPr kumimoji="0" lang="en-US" sz="6600" b="1" i="0" u="none" strike="noStrike" kern="0" cap="none" spc="0" normalizeH="0" noProof="0" dirty="0" smtClean="0">
-                <a:ln>
-                  <a:noFill/>
-                </a:ln>
-                <a:solidFill>
-                  <a:srgbClr val="9BC5E1"/>
-                </a:solidFill>
-                <a:effectLst/>
-                <a:uLnTx/>
-                <a:uFillTx/>
-                <a:latin typeface="Arial Rounded MT Bold" charset="0"/>
-                <a:ea typeface="+mj-ea"/>
-                <a:cs typeface="+mj-cs"/>
-                <a:sym typeface="Arial" charset="0"/>
-              </a:rPr>
-              <a:t>JavaScript</a:t>
-            </a:r>
-            <a:br>
-              <a:rPr kumimoji="0" lang="en-US" sz="6600" b="1" i="0" u="none" strike="noStrike" kern="0" cap="none" spc="0" normalizeH="0" noProof="0" dirty="0" smtClean="0">
-                <a:ln>
-                  <a:noFill/>
-                </a:ln>
-                <a:solidFill>
-                  <a:srgbClr val="9BC5E1"/>
-                </a:solidFill>
-                <a:effectLst/>
-                <a:uLnTx/>
-                <a:uFillTx/>
-                <a:latin typeface="Arial Rounded MT Bold" charset="0"/>
-                <a:ea typeface="+mj-ea"/>
-                <a:cs typeface="+mj-cs"/>
-                <a:sym typeface="Arial" charset="0"/>
-              </a:rPr>
-            </a:br>
-            <a:r>
-              <a:rPr kumimoji="0" lang="en-US" sz="6600" b="1" i="0" u="none" strike="noStrike" kern="0" cap="none" spc="0" normalizeH="0" noProof="0" dirty="0" smtClean="0">
-                <a:ln>
-                  <a:noFill/>
-                </a:ln>
-                <a:solidFill>
-                  <a:srgbClr val="9BC5E1"/>
-                </a:solidFill>
-                <a:effectLst/>
-                <a:uLnTx/>
-                <a:uFillTx/>
-                <a:latin typeface="Arial Rounded MT Bold" charset="0"/>
-                <a:ea typeface="+mj-ea"/>
-                <a:cs typeface="+mj-cs"/>
-                <a:sym typeface="Arial" charset="0"/>
-              </a:rPr>
-              <a:t>demonstration</a:t>
-            </a:r>
-          </a:p>
-        </p:txBody>
-      </p:sp>
-    </p:spTree>
-  </p:cSld>
-  <p:clrMapOvr>
-    <a:masterClrMapping/>
-  </p:clrMapOvr>
-  <p:transition>
-    <p:fade/>
-  </p:transition>
-  <p:timing>
-    <p:tnLst>
-      <p:par>
-        <p:cTn id="1" dur="indefinite" restart="never" nodeType="tmRoot">
-          <p:childTnLst>
-            <p:seq concurrent="1" nextAc="seek">
-              <p:cTn id="2" dur="indefinite" nodeType="mainSeq">
-                <p:childTnLst>
-                  <p:par>
-                    <p:cTn id="3" fill="hold">
-                      <p:stCondLst>
-                        <p:cond delay="indefinite"/>
-                      </p:stCondLst>
-                      <p:childTnLst>
-                        <p:par>
-                          <p:cTn id="4" fill="hold">
-                            <p:stCondLst>
-                              <p:cond delay="0"/>
-                            </p:stCondLst>
-                            <p:childTnLst>
-                              <p:par>
-                                <p:cTn id="5" presetID="10" presetClass="entr" presetSubtype="0" fill="hold" grpId="0" nodeType="clickEffect">
-                                  <p:stCondLst>
-                                    <p:cond delay="0"/>
-                                  </p:stCondLst>
-                                  <p:childTnLst>
-                                    <p:set>
-                                      <p:cBhvr>
-                                        <p:cTn id="6" dur="1" fill="hold">
-                                          <p:stCondLst>
-                                            <p:cond delay="0"/>
-                                          </p:stCondLst>
-                                        </p:cTn>
-                                        <p:tgtEl>
-                                          <p:spTgt spid="7"/>
-                                        </p:tgtEl>
-                                        <p:attrNameLst>
-                                          <p:attrName>style.visibility</p:attrName>
-                                        </p:attrNameLst>
-                                      </p:cBhvr>
-                                      <p:to>
-                                        <p:strVal val="visible"/>
-                                      </p:to>
-                                    </p:set>
-                                    <p:animEffect transition="in" filter="fade">
-                                      <p:cBhvr>
-                                        <p:cTn id="7" dur="1000"/>
-                                        <p:tgtEl>
-                                          <p:spTgt spid="7"/>
-                                        </p:tgtEl>
-                                      </p:cBhvr>
-                                    </p:animEffect>
-                                  </p:childTnLst>
-                                </p:cTn>
-                              </p:par>
-                            </p:childTnLst>
-                          </p:cTn>
-                        </p:par>
-                      </p:childTnLst>
-                    </p:cTn>
-                  </p:par>
-                </p:childTnLst>
-              </p:cTn>
-              <p:prevCondLst>
-                <p:cond evt="onPrev" delay="0">
-                  <p:tgtEl>
-                    <p:sldTgt/>
-                  </p:tgtEl>
-                </p:cond>
-              </p:prevCondLst>
-              <p:nextCondLst>
-                <p:cond evt="onNext" delay="0">
-                  <p:tgtEl>
-                    <p:sldTgt/>
-                  </p:tgtEl>
-                </p:cond>
-              </p:nextCondLst>
-            </p:seq>
-          </p:childTnLst>
-        </p:cTn>
-      </p:par>
-    </p:tnLst>
-    <p:bldLst>
-      <p:bldP spid="7" grpId="0" animBg="1"/>
-    </p:bldLst>
-  </p:timing>
-</p:sld>
-</file>
-
-<file path=ppt/slides/slide24.xml><?xml version="1.0" encoding="utf-8"?>
+<file path=ppt/slides/slide22.xml><?xml version="1.0" encoding="utf-8"?>
 <p:sld xmlns:a="http://schemas.openxmlformats.org/drawingml/2006/main" xmlns:r="http://schemas.openxmlformats.org/officeDocument/2006/relationships" xmlns:mc="http://schemas.openxmlformats.org/markup-compatibility/2006" xmlns:mv="urn:schemas-microsoft-com:mac:vml" xmlns:p="http://schemas.openxmlformats.org/presentationml/2006/main" mc:Ignorable="mv" mc:PreserveAttributes="mv:*">
   <p:cSld>
     <p:spTree>
@@ -15950,328 +12954,7 @@
 </p:sld>
 </file>
 
-<file path=ppt/slides/slide25.xml><?xml version="1.0" encoding="utf-8"?>
-<p:sld xmlns:a="http://schemas.openxmlformats.org/drawingml/2006/main" xmlns:r="http://schemas.openxmlformats.org/officeDocument/2006/relationships" xmlns:mc="http://schemas.openxmlformats.org/markup-compatibility/2006" xmlns:mv="urn:schemas-microsoft-com:mac:vml" xmlns:p="http://schemas.openxmlformats.org/presentationml/2006/main" mc:Ignorable="mv" mc:PreserveAttributes="mv:*">
-  <p:cSld>
-    <p:spTree>
-      <p:nvGrpSpPr>
-        <p:cNvPr id="1" name=""/>
-        <p:cNvGrpSpPr/>
-        <p:nvPr/>
-      </p:nvGrpSpPr>
-      <p:grpSpPr>
-        <a:xfrm>
-          <a:off x="0" y="0"/>
-          <a:ext cx="0" cy="0"/>
-          <a:chOff x="0" y="0"/>
-          <a:chExt cx="0" cy="0"/>
-        </a:xfrm>
-      </p:grpSpPr>
-      <p:sp>
-        <p:nvSpPr>
-          <p:cNvPr id="6" name="Text Placeholder 5"/>
-          <p:cNvSpPr>
-            <a:spLocks noGrp="1"/>
-          </p:cNvSpPr>
-          <p:nvPr>
-            <p:ph type="body" sz="half" idx="2"/>
-          </p:nvPr>
-        </p:nvSpPr>
-        <p:spPr>
-          <a:xfrm>
-            <a:off x="533400" y="609600"/>
-            <a:ext cx="8077200" cy="1971600"/>
-          </a:xfrm>
-        </p:spPr>
-        <p:txBody>
-          <a:bodyPr numCol="1" spcCol="0" anchor="t" anchorCtr="0"/>
-          <a:lstStyle/>
-          <a:p>
-            <a:pPr algn="just"/>
-            <a:r>
-              <a:rPr lang="en-US" dirty="0" smtClean="0"/>
-              <a:t>The </a:t>
-            </a:r>
-            <a:r>
-              <a:rPr lang="en-US" b="1" dirty="0" smtClean="0">
-                <a:solidFill>
-                  <a:srgbClr val="5293BF"/>
-                </a:solidFill>
-              </a:rPr>
-              <a:t>web UI</a:t>
-            </a:r>
-            <a:r>
-              <a:rPr lang="en-US" dirty="0" smtClean="0"/>
-              <a:t> built into DB Relay is an example of building a rich Internet application on the top of DB Relay server using the Sencha (ExtJS) framework. It implements a SQL query UI and table editor (WIP).</a:t>
-            </a:r>
-            <a:endParaRPr lang="en-US" dirty="0"/>
-          </a:p>
-        </p:txBody>
-      </p:sp>
-      <p:sp>
-        <p:nvSpPr>
-          <p:cNvPr id="4" name="Title 3"/>
-          <p:cNvSpPr>
-            <a:spLocks noGrp="1"/>
-          </p:cNvSpPr>
-          <p:nvPr>
-            <p:ph type="title"/>
-          </p:nvPr>
-        </p:nvSpPr>
-        <p:spPr/>
-        <p:txBody>
-          <a:bodyPr/>
-          <a:lstStyle/>
-          <a:p>
-            <a:r>
-              <a:rPr lang="en-US" dirty="0" smtClean="0"/>
-              <a:t>Web UI as example application</a:t>
-            </a:r>
-            <a:endParaRPr lang="en-US" dirty="0"/>
-          </a:p>
-        </p:txBody>
-      </p:sp>
-      <p:pic>
-        <p:nvPicPr>
-          <p:cNvPr id="13" name="Picture Placeholder 12" descr="100707_dbrelay_webui.png"/>
-          <p:cNvPicPr>
-            <a:picLocks noGrp="1" noChangeAspect="1"/>
-          </p:cNvPicPr>
-          <p:nvPr>
-            <p:ph type="pic" idx="1"/>
-          </p:nvPr>
-        </p:nvPicPr>
-        <p:blipFill>
-          <a:blip r:embed="rId2"/>
-          <a:srcRect l="-492" r="-492"/>
-          <a:stretch>
-            <a:fillRect/>
-          </a:stretch>
-        </p:blipFill>
-        <p:spPr>
-          <a:xfrm>
-            <a:off x="1830388" y="2667000"/>
-            <a:ext cx="5486400" cy="2913063"/>
-          </a:xfrm>
-        </p:spPr>
-      </p:pic>
-      <p:sp>
-        <p:nvSpPr>
-          <p:cNvPr id="5" name="Title 9"/>
-          <p:cNvSpPr txBox="1">
-            <a:spLocks/>
-          </p:cNvSpPr>
-          <p:nvPr/>
-        </p:nvSpPr>
-        <p:spPr bwMode="auto">
-          <a:xfrm>
-            <a:off x="2368387" y="3274317"/>
-            <a:ext cx="6358151" cy="2400657"/>
-          </a:xfrm>
-          <a:prstGeom prst="rect">
-            <a:avLst/>
-          </a:prstGeom>
-          <a:gradFill flip="none" rotWithShape="1">
-            <a:gsLst>
-              <a:gs pos="0">
-                <a:schemeClr val="bg1">
-                  <a:alpha val="0"/>
-                </a:schemeClr>
-              </a:gs>
-              <a:gs pos="40000">
-                <a:schemeClr val="bg1"/>
-              </a:gs>
-            </a:gsLst>
-            <a:lin ang="0" scaled="1"/>
-            <a:tileRect/>
-          </a:gradFill>
-          <a:ln w="12700">
-            <a:noFill/>
-            <a:miter lim="800000"/>
-            <a:headEnd/>
-            <a:tailEnd/>
-          </a:ln>
-        </p:spPr>
-        <p:txBody>
-          <a:bodyPr vert="horz" wrap="none" lIns="182880" tIns="182880" rIns="182880" bIns="182880" numCol="1" anchor="ctr" anchorCtr="0" compatLnSpc="1">
-            <a:prstTxWarp prst="textNoShape">
-              <a:avLst/>
-            </a:prstTxWarp>
-            <a:spAutoFit/>
-          </a:bodyPr>
-          <a:lstStyle/>
-          <a:p>
-            <a:pPr marL="0" marR="0" lvl="0" indent="0" algn="r" defTabSz="914400" rtl="0" eaLnBrk="0" fontAlgn="base" latinLnBrk="0" hangingPunct="0">
-              <a:lnSpc>
-                <a:spcPct val="100000"/>
-              </a:lnSpc>
-              <a:spcBef>
-                <a:spcPct val="0"/>
-              </a:spcBef>
-              <a:spcAft>
-                <a:spcPct val="0"/>
-              </a:spcAft>
-              <a:buClrTx/>
-              <a:buSzTx/>
-              <a:buFontTx/>
-              <a:buNone/>
-              <a:tabLst/>
-              <a:defRPr/>
-            </a:pPr>
-            <a:r>
-              <a:rPr kumimoji="0" lang="en-US" sz="6600" b="1" i="0" u="none" strike="noStrike" kern="0" cap="none" spc="0" normalizeH="0" noProof="0" dirty="0" smtClean="0">
-                <a:ln>
-                  <a:noFill/>
-                </a:ln>
-                <a:solidFill>
-                  <a:srgbClr val="9BC5E1"/>
-                </a:solidFill>
-                <a:effectLst/>
-                <a:uLnTx/>
-                <a:uFillTx/>
-                <a:latin typeface="Arial Rounded MT Bold" charset="0"/>
-                <a:ea typeface="+mj-ea"/>
-                <a:cs typeface="+mj-cs"/>
-                <a:sym typeface="Arial" charset="0"/>
-              </a:rPr>
-              <a:t>Web UI</a:t>
-            </a:r>
-            <a:br>
-              <a:rPr kumimoji="0" lang="en-US" sz="6600" b="1" i="0" u="none" strike="noStrike" kern="0" cap="none" spc="0" normalizeH="0" noProof="0" dirty="0" smtClean="0">
-                <a:ln>
-                  <a:noFill/>
-                </a:ln>
-                <a:solidFill>
-                  <a:srgbClr val="9BC5E1"/>
-                </a:solidFill>
-                <a:effectLst/>
-                <a:uLnTx/>
-                <a:uFillTx/>
-                <a:latin typeface="Arial Rounded MT Bold" charset="0"/>
-                <a:ea typeface="+mj-ea"/>
-                <a:cs typeface="+mj-cs"/>
-                <a:sym typeface="Arial" charset="0"/>
-              </a:rPr>
-            </a:br>
-            <a:r>
-              <a:rPr kumimoji="0" lang="en-US" sz="6600" b="1" i="0" u="none" strike="noStrike" kern="0" cap="none" spc="0" normalizeH="0" noProof="0" dirty="0" smtClean="0">
-                <a:ln>
-                  <a:noFill/>
-                </a:ln>
-                <a:solidFill>
-                  <a:srgbClr val="9BC5E1"/>
-                </a:solidFill>
-                <a:effectLst/>
-                <a:uLnTx/>
-                <a:uFillTx/>
-                <a:latin typeface="Arial Rounded MT Bold" charset="0"/>
-                <a:ea typeface="+mj-ea"/>
-                <a:cs typeface="+mj-cs"/>
-                <a:sym typeface="Arial" charset="0"/>
-              </a:rPr>
-              <a:t>demonstration</a:t>
-            </a:r>
-          </a:p>
-        </p:txBody>
-      </p:sp>
-    </p:spTree>
-  </p:cSld>
-  <p:clrMapOvr>
-    <a:masterClrMapping/>
-  </p:clrMapOvr>
-  <p:transition>
-    <p:fade/>
-  </p:transition>
-  <p:timing>
-    <p:tnLst>
-      <p:par>
-        <p:cTn id="1" dur="indefinite" restart="never" nodeType="tmRoot">
-          <p:childTnLst>
-            <p:seq concurrent="1" nextAc="seek">
-              <p:cTn id="2" dur="indefinite" nodeType="mainSeq">
-                <p:childTnLst>
-                  <p:par>
-                    <p:cTn id="3" fill="hold">
-                      <p:stCondLst>
-                        <p:cond delay="indefinite"/>
-                      </p:stCondLst>
-                      <p:childTnLst>
-                        <p:par>
-                          <p:cTn id="4" fill="hold">
-                            <p:stCondLst>
-                              <p:cond delay="0"/>
-                            </p:stCondLst>
-                            <p:childTnLst>
-                              <p:par>
-                                <p:cTn id="5" presetID="10" presetClass="entr" presetSubtype="0" fill="hold" grpId="0" nodeType="clickEffect">
-                                  <p:stCondLst>
-                                    <p:cond delay="0"/>
-                                  </p:stCondLst>
-                                  <p:childTnLst>
-                                    <p:set>
-                                      <p:cBhvr>
-                                        <p:cTn id="6" dur="1" fill="hold">
-                                          <p:stCondLst>
-                                            <p:cond delay="0"/>
-                                          </p:stCondLst>
-                                        </p:cTn>
-                                        <p:tgtEl>
-                                          <p:spTgt spid="5"/>
-                                        </p:tgtEl>
-                                        <p:attrNameLst>
-                                          <p:attrName>style.visibility</p:attrName>
-                                        </p:attrNameLst>
-                                      </p:cBhvr>
-                                      <p:to>
-                                        <p:strVal val="visible"/>
-                                      </p:to>
-                                    </p:set>
-                                    <p:animEffect transition="in" filter="fade">
-                                      <p:cBhvr>
-                                        <p:cTn id="7" dur="1000"/>
-                                        <p:tgtEl>
-                                          <p:spTgt spid="5"/>
-                                        </p:tgtEl>
-                                      </p:cBhvr>
-                                    </p:animEffect>
-                                  </p:childTnLst>
-                                </p:cTn>
-                              </p:par>
-                            </p:childTnLst>
-                          </p:cTn>
-                        </p:par>
-                      </p:childTnLst>
-                    </p:cTn>
-                  </p:par>
-                </p:childTnLst>
-              </p:cTn>
-              <p:prevCondLst>
-                <p:cond evt="onPrev" delay="0">
-                  <p:tgtEl>
-                    <p:sldTgt/>
-                  </p:tgtEl>
-                </p:cond>
-              </p:prevCondLst>
-              <p:nextCondLst>
-                <p:cond evt="onNext" delay="0">
-                  <p:tgtEl>
-                    <p:sldTgt/>
-                  </p:tgtEl>
-                </p:cond>
-              </p:nextCondLst>
-            </p:seq>
-          </p:childTnLst>
-        </p:cTn>
-      </p:par>
-    </p:tnLst>
-    <p:bldLst>
-      <p:bldP spid="5" grpId="0" animBg="1"/>
-    </p:bldLst>
-  </p:timing>
-</p:sld>
-</file>
-
-<file path=ppt/slides/slide26.xml><?xml version="1.0" encoding="utf-8"?>
+<file path=ppt/slides/slide23.xml><?xml version="1.0" encoding="utf-8"?>
 <p:sld xmlns:a="http://schemas.openxmlformats.org/drawingml/2006/main" xmlns:r="http://schemas.openxmlformats.org/officeDocument/2006/relationships" xmlns:mc="http://schemas.openxmlformats.org/markup-compatibility/2006" xmlns:mv="urn:schemas-microsoft-com:mac:vml" xmlns:p="http://schemas.openxmlformats.org/presentationml/2006/main" mc:Ignorable="mv" mc:PreserveAttributes="mv:*">
   <p:cSld>
     <p:spTree>
@@ -16394,365 +13077,7 @@
 </p:sld>
 </file>
 
-<file path=ppt/slides/slide27.xml><?xml version="1.0" encoding="utf-8"?>
-<p:sld xmlns:a="http://schemas.openxmlformats.org/drawingml/2006/main" xmlns:r="http://schemas.openxmlformats.org/officeDocument/2006/relationships" xmlns:mc="http://schemas.openxmlformats.org/markup-compatibility/2006" xmlns:mv="urn:schemas-microsoft-com:mac:vml" xmlns:p="http://schemas.openxmlformats.org/presentationml/2006/main" mc:Ignorable="mv" mc:PreserveAttributes="mv:*">
-  <p:cSld>
-    <p:spTree>
-      <p:nvGrpSpPr>
-        <p:cNvPr id="1" name=""/>
-        <p:cNvGrpSpPr/>
-        <p:nvPr/>
-      </p:nvGrpSpPr>
-      <p:grpSpPr>
-        <a:xfrm>
-          <a:off x="0" y="0"/>
-          <a:ext cx="0" cy="0"/>
-          <a:chOff x="0" y="0"/>
-          <a:chExt cx="0" cy="0"/>
-        </a:xfrm>
-      </p:grpSpPr>
-      <p:sp>
-        <p:nvSpPr>
-          <p:cNvPr id="6" name="Text Placeholder 5"/>
-          <p:cNvSpPr>
-            <a:spLocks noGrp="1"/>
-          </p:cNvSpPr>
-          <p:nvPr>
-            <p:ph type="body" sz="half" idx="2"/>
-          </p:nvPr>
-        </p:nvSpPr>
-        <p:spPr>
-          <a:xfrm>
-            <a:off x="533400" y="609600"/>
-            <a:ext cx="8077199" cy="1666800"/>
-          </a:xfrm>
-        </p:spPr>
-        <p:txBody>
-          <a:bodyPr numCol="1" anchor="t" anchorCtr="0"/>
-          <a:lstStyle/>
-          <a:p>
-            <a:pPr algn="just"/>
-            <a:r>
-              <a:rPr lang="en-US" dirty="0" smtClean="0"/>
-              <a:t>As a part of its web UI, DB Relay provides the </a:t>
-            </a:r>
-            <a:r>
-              <a:rPr lang="en-US" b="1" dirty="0" smtClean="0">
-                <a:solidFill>
-                  <a:srgbClr val="5293BF"/>
-                </a:solidFill>
-              </a:rPr>
-              <a:t>connector status </a:t>
-            </a:r>
-            <a:r>
-              <a:rPr lang="en-US" dirty="0" smtClean="0"/>
-              <a:t>window, which allows the user to browse active connections. From the same window users can terminate connectors running offending queries.</a:t>
-            </a:r>
-            <a:endParaRPr lang="en-US" dirty="0"/>
-          </a:p>
-        </p:txBody>
-      </p:sp>
-      <p:sp>
-        <p:nvSpPr>
-          <p:cNvPr id="4" name="Title 3"/>
-          <p:cNvSpPr>
-            <a:spLocks noGrp="1"/>
-          </p:cNvSpPr>
-          <p:nvPr>
-            <p:ph type="title"/>
-          </p:nvPr>
-        </p:nvSpPr>
-        <p:spPr/>
-        <p:txBody>
-          <a:bodyPr/>
-          <a:lstStyle/>
-          <a:p>
-            <a:r>
-              <a:rPr lang="en-US" dirty="0" smtClean="0"/>
-              <a:t>Managing connectors via web UI</a:t>
-            </a:r>
-            <a:endParaRPr lang="en-US" dirty="0"/>
-          </a:p>
-        </p:txBody>
-      </p:sp>
-      <p:pic>
-        <p:nvPicPr>
-          <p:cNvPr id="9" name="Picture Placeholder 8" descr="100708_dbrelay_connection_mgmt.png"/>
-          <p:cNvPicPr>
-            <a:picLocks noGrp="1" noChangeAspect="1"/>
-          </p:cNvPicPr>
-          <p:nvPr>
-            <p:ph type="pic" idx="1"/>
-          </p:nvPr>
-        </p:nvPicPr>
-        <p:blipFill>
-          <a:blip r:embed="rId2"/>
-          <a:srcRect t="-3238" b="-3238"/>
-          <a:stretch>
-            <a:fillRect/>
-          </a:stretch>
-        </p:blipFill>
-        <p:spPr>
-          <a:xfrm>
-            <a:off x="381000" y="2276400"/>
-            <a:ext cx="8382000" cy="3370263"/>
-          </a:xfrm>
-        </p:spPr>
-      </p:pic>
-      <p:sp>
-        <p:nvSpPr>
-          <p:cNvPr id="10" name="Title 9"/>
-          <p:cNvSpPr txBox="1">
-            <a:spLocks/>
-          </p:cNvSpPr>
-          <p:nvPr/>
-        </p:nvSpPr>
-        <p:spPr bwMode="auto">
-          <a:xfrm>
-            <a:off x="2514600" y="2316143"/>
-            <a:ext cx="6360193" cy="3416320"/>
-          </a:xfrm>
-          <a:prstGeom prst="rect">
-            <a:avLst/>
-          </a:prstGeom>
-          <a:gradFill flip="none" rotWithShape="1">
-            <a:gsLst>
-              <a:gs pos="0">
-                <a:schemeClr val="bg1">
-                  <a:alpha val="0"/>
-                </a:schemeClr>
-              </a:gs>
-              <a:gs pos="40000">
-                <a:schemeClr val="bg1"/>
-              </a:gs>
-            </a:gsLst>
-            <a:lin ang="0" scaled="1"/>
-            <a:tileRect/>
-          </a:gradFill>
-          <a:ln w="12700">
-            <a:noFill/>
-            <a:miter lim="800000"/>
-            <a:headEnd/>
-            <a:tailEnd/>
-          </a:ln>
-        </p:spPr>
-        <p:txBody>
-          <a:bodyPr vert="horz" wrap="none" lIns="182880" tIns="182880" rIns="182880" bIns="182880" numCol="1" anchor="ctr" anchorCtr="0" compatLnSpc="1">
-            <a:prstTxWarp prst="textNoShape">
-              <a:avLst/>
-            </a:prstTxWarp>
-            <a:spAutoFit/>
-          </a:bodyPr>
-          <a:lstStyle/>
-          <a:p>
-            <a:pPr marL="0" marR="0" lvl="0" indent="0" algn="r" defTabSz="914400" rtl="0" eaLnBrk="0" fontAlgn="base" latinLnBrk="0" hangingPunct="0">
-              <a:lnSpc>
-                <a:spcPct val="100000"/>
-              </a:lnSpc>
-              <a:spcBef>
-                <a:spcPct val="0"/>
-              </a:spcBef>
-              <a:spcAft>
-                <a:spcPct val="0"/>
-              </a:spcAft>
-              <a:buClrTx/>
-              <a:buSzTx/>
-              <a:buFontTx/>
-              <a:buNone/>
-              <a:tabLst/>
-              <a:defRPr/>
-            </a:pPr>
-            <a:r>
-              <a:rPr kumimoji="0" lang="en-US" sz="6600" b="1" i="0" u="none" strike="noStrike" kern="0" cap="none" spc="0" normalizeH="0" noProof="0" dirty="0" smtClean="0">
-                <a:ln>
-                  <a:noFill/>
-                </a:ln>
-                <a:solidFill>
-                  <a:srgbClr val="9BC5E1"/>
-                </a:solidFill>
-                <a:effectLst/>
-                <a:uLnTx/>
-                <a:uFillTx/>
-                <a:latin typeface="Arial Rounded MT Bold" charset="0"/>
-                <a:ea typeface="+mj-ea"/>
-                <a:cs typeface="+mj-cs"/>
-                <a:sym typeface="Arial" charset="0"/>
-              </a:rPr>
-              <a:t>Managing</a:t>
-            </a:r>
-          </a:p>
-          <a:p>
-            <a:pPr marL="0" marR="0" lvl="0" indent="0" algn="r" defTabSz="914400" rtl="0" eaLnBrk="0" fontAlgn="base" latinLnBrk="0" hangingPunct="0">
-              <a:lnSpc>
-                <a:spcPct val="100000"/>
-              </a:lnSpc>
-              <a:spcBef>
-                <a:spcPct val="0"/>
-              </a:spcBef>
-              <a:spcAft>
-                <a:spcPct val="0"/>
-              </a:spcAft>
-              <a:buClrTx/>
-              <a:buSzTx/>
-              <a:buFontTx/>
-              <a:buNone/>
-              <a:tabLst/>
-              <a:defRPr/>
-            </a:pPr>
-            <a:r>
-              <a:rPr kumimoji="0" lang="en-US" sz="6600" b="1" i="0" u="none" strike="noStrike" kern="0" cap="none" spc="0" normalizeH="0" noProof="0" dirty="0" smtClean="0">
-                <a:ln>
-                  <a:noFill/>
-                </a:ln>
-                <a:solidFill>
-                  <a:srgbClr val="9BC5E1"/>
-                </a:solidFill>
-                <a:effectLst/>
-                <a:uLnTx/>
-                <a:uFillTx/>
-                <a:latin typeface="Arial Rounded MT Bold" charset="0"/>
-                <a:ea typeface="+mj-ea"/>
-                <a:cs typeface="+mj-cs"/>
-                <a:sym typeface="Arial" charset="0"/>
-              </a:rPr>
-              <a:t>connectors</a:t>
-            </a:r>
-            <a:br>
-              <a:rPr kumimoji="0" lang="en-US" sz="6600" b="1" i="0" u="none" strike="noStrike" kern="0" cap="none" spc="0" normalizeH="0" noProof="0" dirty="0" smtClean="0">
-                <a:ln>
-                  <a:noFill/>
-                </a:ln>
-                <a:solidFill>
-                  <a:srgbClr val="9BC5E1"/>
-                </a:solidFill>
-                <a:effectLst/>
-                <a:uLnTx/>
-                <a:uFillTx/>
-                <a:latin typeface="Arial Rounded MT Bold" charset="0"/>
-                <a:ea typeface="+mj-ea"/>
-                <a:cs typeface="+mj-cs"/>
-                <a:sym typeface="Arial" charset="0"/>
-              </a:rPr>
-            </a:br>
-            <a:r>
-              <a:rPr kumimoji="0" lang="en-US" sz="6600" b="1" i="0" u="none" strike="noStrike" kern="0" cap="none" spc="0" normalizeH="0" noProof="0" dirty="0" smtClean="0">
-                <a:ln>
-                  <a:noFill/>
-                </a:ln>
-                <a:solidFill>
-                  <a:srgbClr val="9BC5E1"/>
-                </a:solidFill>
-                <a:effectLst/>
-                <a:uLnTx/>
-                <a:uFillTx/>
-                <a:latin typeface="Arial Rounded MT Bold" charset="0"/>
-                <a:ea typeface="+mj-ea"/>
-                <a:cs typeface="+mj-cs"/>
-                <a:sym typeface="Arial" charset="0"/>
-              </a:rPr>
-              <a:t>demonstration</a:t>
-            </a:r>
-          </a:p>
-        </p:txBody>
-      </p:sp>
-    </p:spTree>
-  </p:cSld>
-  <p:clrMapOvr>
-    <a:masterClrMapping/>
-  </p:clrMapOvr>
-  <p:transition>
-    <p:fade/>
-  </p:transition>
-  <p:timing>
-    <p:tnLst>
-      <p:par>
-        <p:cTn id="1" dur="indefinite" restart="never" nodeType="tmRoot">
-          <p:childTnLst>
-            <p:seq concurrent="1" nextAc="seek">
-              <p:cTn id="2" dur="indefinite" nodeType="mainSeq">
-                <p:childTnLst>
-                  <p:par>
-                    <p:cTn id="3" fill="hold">
-                      <p:stCondLst>
-                        <p:cond delay="indefinite"/>
-                      </p:stCondLst>
-                      <p:childTnLst>
-                        <p:par>
-                          <p:cTn id="4" fill="hold">
-                            <p:stCondLst>
-                              <p:cond delay="0"/>
-                            </p:stCondLst>
-                            <p:childTnLst>
-                              <p:par>
-                                <p:cTn id="5" presetID="10" presetClass="entr" presetSubtype="0" fill="hold" grpId="0" nodeType="clickEffect">
-                                  <p:stCondLst>
-                                    <p:cond delay="0"/>
-                                  </p:stCondLst>
-                                  <p:childTnLst>
-                                    <p:set>
-                                      <p:cBhvr>
-                                        <p:cTn id="6" dur="1" fill="hold">
-                                          <p:stCondLst>
-                                            <p:cond delay="0"/>
-                                          </p:stCondLst>
-                                        </p:cTn>
-                                        <p:tgtEl>
-                                          <p:spTgt spid="10"/>
-                                        </p:tgtEl>
-                                        <p:attrNameLst>
-                                          <p:attrName>style.visibility</p:attrName>
-                                        </p:attrNameLst>
-                                      </p:cBhvr>
-                                      <p:to>
-                                        <p:strVal val="visible"/>
-                                      </p:to>
-                                    </p:set>
-                                    <p:animEffect transition="in" filter="fade">
-                                      <p:cBhvr>
-                                        <p:cTn id="7" dur="1000"/>
-                                        <p:tgtEl>
-                                          <p:spTgt spid="10"/>
-                                        </p:tgtEl>
-                                      </p:cBhvr>
-                                    </p:animEffect>
-                                  </p:childTnLst>
-                                </p:cTn>
-                              </p:par>
-                            </p:childTnLst>
-                          </p:cTn>
-                        </p:par>
-                      </p:childTnLst>
-                    </p:cTn>
-                  </p:par>
-                </p:childTnLst>
-              </p:cTn>
-              <p:prevCondLst>
-                <p:cond evt="onPrev" delay="0">
-                  <p:tgtEl>
-                    <p:sldTgt/>
-                  </p:tgtEl>
-                </p:cond>
-              </p:prevCondLst>
-              <p:nextCondLst>
-                <p:cond evt="onNext" delay="0">
-                  <p:tgtEl>
-                    <p:sldTgt/>
-                  </p:tgtEl>
-                </p:cond>
-              </p:nextCondLst>
-            </p:seq>
-          </p:childTnLst>
-        </p:cTn>
-      </p:par>
-    </p:tnLst>
-    <p:bldLst>
-      <p:bldP spid="10" grpId="0" animBg="1"/>
-    </p:bldLst>
-  </p:timing>
-</p:sld>
-</file>
-
-<file path=ppt/slides/slide28.xml><?xml version="1.0" encoding="utf-8"?>
+<file path=ppt/slides/slide24.xml><?xml version="1.0" encoding="utf-8"?>
 <p:sld xmlns:a="http://schemas.openxmlformats.org/drawingml/2006/main" xmlns:r="http://schemas.openxmlformats.org/officeDocument/2006/relationships" xmlns:mc="http://schemas.openxmlformats.org/markup-compatibility/2006" xmlns:mv="urn:schemas-microsoft-com:mac:vml" xmlns:p="http://schemas.openxmlformats.org/presentationml/2006/main" mc:Ignorable="mv" mc:PreserveAttributes="mv:*">
   <p:cSld>
     <p:spTree>
@@ -16829,7 +13154,7 @@
 </p:sld>
 </file>
 
-<file path=ppt/slides/slide29.xml><?xml version="1.0" encoding="utf-8"?>
+<file path=ppt/slides/slide25.xml><?xml version="1.0" encoding="utf-8"?>
 <p:sld xmlns:a="http://schemas.openxmlformats.org/drawingml/2006/main" xmlns:r="http://schemas.openxmlformats.org/officeDocument/2006/relationships" xmlns:mc="http://schemas.openxmlformats.org/markup-compatibility/2006" xmlns:mv="urn:schemas-microsoft-com:mac:vml" xmlns:p="http://schemas.openxmlformats.org/presentationml/2006/main" mc:Ignorable="mv" mc:PreserveAttributes="mv:*">
   <p:cSld>
     <p:spTree>
@@ -18270,121 +14595,7 @@
 </p:sld>
 </file>
 
-<file path=ppt/slides/slide3.xml><?xml version="1.0" encoding="utf-8"?>
-<p:sld xmlns:a="http://schemas.openxmlformats.org/drawingml/2006/main" xmlns:r="http://schemas.openxmlformats.org/officeDocument/2006/relationships" xmlns:mc="http://schemas.openxmlformats.org/markup-compatibility/2006" xmlns:mv="urn:schemas-microsoft-com:mac:vml" xmlns:p="http://schemas.openxmlformats.org/presentationml/2006/main" mc:Ignorable="mv" mc:PreserveAttributes="mv:*">
-  <p:cSld>
-    <p:spTree>
-      <p:nvGrpSpPr>
-        <p:cNvPr id="1" name=""/>
-        <p:cNvGrpSpPr/>
-        <p:nvPr/>
-      </p:nvGrpSpPr>
-      <p:grpSpPr>
-        <a:xfrm>
-          <a:off x="0" y="0"/>
-          <a:ext cx="0" cy="0"/>
-          <a:chOff x="0" y="0"/>
-          <a:chExt cx="0" cy="0"/>
-        </a:xfrm>
-      </p:grpSpPr>
-      <p:sp>
-        <p:nvSpPr>
-          <p:cNvPr id="29698" name="Rectangle 2"/>
-          <p:cNvSpPr>
-            <a:spLocks noGrp="1" noChangeArrowheads="1"/>
-          </p:cNvSpPr>
-          <p:nvPr>
-            <p:ph type="body" idx="1"/>
-          </p:nvPr>
-        </p:nvSpPr>
-        <p:spPr>
-          <a:xfrm>
-            <a:off x="1315264" y="757249"/>
-            <a:ext cx="6518672" cy="4572000"/>
-          </a:xfrm>
-          <a:noFill/>
-          <a:ln w="76200">
-            <a:solidFill>
-              <a:srgbClr val="5293BF"/>
-            </a:solidFill>
-          </a:ln>
-          <a:effectLst>
-            <a:softEdge rad="292100"/>
-          </a:effectLst>
-        </p:spPr>
-        <p:txBody>
-          <a:bodyPr anchor="ctr"/>
-          <a:lstStyle/>
-          <a:p>
-            <a:pPr marL="0" algn="ctr" eaLnBrk="1" hangingPunct="1">
-              <a:buNone/>
-              <a:defRPr/>
-            </a:pPr>
-            <a:r>
-              <a:rPr lang="en-US" sz="3100" dirty="0" smtClean="0">
-                <a:latin typeface="Arial Rounded MT Bold" charset="0"/>
-              </a:rPr>
-              <a:t>Database access is</a:t>
-            </a:r>
-          </a:p>
-          <a:p>
-            <a:pPr marL="0" algn="ctr" eaLnBrk="1" hangingPunct="1">
-              <a:buNone/>
-              <a:defRPr/>
-            </a:pPr>
-            <a:r>
-              <a:rPr lang="en-US" sz="3100" dirty="0" smtClean="0">
-                <a:latin typeface="Arial Rounded MT Bold" charset="0"/>
-              </a:rPr>
-              <a:t>WAY   TOO   HARD</a:t>
-            </a:r>
-          </a:p>
-        </p:txBody>
-      </p:sp>
-      <p:sp>
-        <p:nvSpPr>
-          <p:cNvPr id="29701" name="Rectangle 1"/>
-          <p:cNvSpPr>
-            <a:spLocks noGrp="1" noChangeArrowheads="1"/>
-          </p:cNvSpPr>
-          <p:nvPr>
-            <p:ph type="title"/>
-          </p:nvPr>
-        </p:nvSpPr>
-        <p:spPr/>
-        <p:txBody>
-          <a:bodyPr/>
-          <a:lstStyle/>
-          <a:p>
-            <a:pPr eaLnBrk="1" hangingPunct="1"/>
-            <a:r>
-              <a:rPr lang="en-US" dirty="0" smtClean="0">
-                <a:latin typeface="Arial Rounded MT Bold" charset="0"/>
-              </a:rPr>
-              <a:t>The crux</a:t>
-            </a:r>
-          </a:p>
-        </p:txBody>
-      </p:sp>
-    </p:spTree>
-  </p:cSld>
-  <p:clrMapOvr>
-    <a:masterClrMapping/>
-  </p:clrMapOvr>
-  <p:transition>
-    <p:fade/>
-  </p:transition>
-  <p:timing>
-    <p:tnLst>
-      <p:par>
-        <p:cTn id="1" dur="indefinite" restart="never" nodeType="tmRoot"/>
-      </p:par>
-    </p:tnLst>
-  </p:timing>
-</p:sld>
-</file>
-
-<file path=ppt/slides/slide30.xml><?xml version="1.0" encoding="utf-8"?>
+<file path=ppt/slides/slide26.xml><?xml version="1.0" encoding="utf-8"?>
 <p:sld xmlns:a="http://schemas.openxmlformats.org/drawingml/2006/main" xmlns:r="http://schemas.openxmlformats.org/officeDocument/2006/relationships" xmlns:mc="http://schemas.openxmlformats.org/markup-compatibility/2006" xmlns:mv="urn:schemas-microsoft-com:mac:vml" xmlns:p="http://schemas.openxmlformats.org/presentationml/2006/main" mc:Ignorable="mv" mc:PreserveAttributes="mv:*">
   <p:cSld>
     <p:spTree>
@@ -18938,7 +15149,7 @@
 </p:sld>
 </file>
 
-<file path=ppt/slides/slide31.xml><?xml version="1.0" encoding="utf-8"?>
+<file path=ppt/slides/slide27.xml><?xml version="1.0" encoding="utf-8"?>
 <p:sld xmlns:a="http://schemas.openxmlformats.org/drawingml/2006/main" xmlns:r="http://schemas.openxmlformats.org/officeDocument/2006/relationships" xmlns:mc="http://schemas.openxmlformats.org/markup-compatibility/2006" xmlns:mv="urn:schemas-microsoft-com:mac:vml" xmlns:p="http://schemas.openxmlformats.org/presentationml/2006/main" mc:Ignorable="mv" mc:PreserveAttributes="mv:*">
   <p:cSld>
     <p:spTree>
@@ -19575,7 +15786,7 @@
 </p:sld>
 </file>
 
-<file path=ppt/slides/slide32.xml><?xml version="1.0" encoding="utf-8"?>
+<file path=ppt/slides/slide28.xml><?xml version="1.0" encoding="utf-8"?>
 <p:sld xmlns:a="http://schemas.openxmlformats.org/drawingml/2006/main" xmlns:r="http://schemas.openxmlformats.org/officeDocument/2006/relationships" xmlns:mc="http://schemas.openxmlformats.org/markup-compatibility/2006" xmlns:mv="urn:schemas-microsoft-com:mac:vml" xmlns:p="http://schemas.openxmlformats.org/presentationml/2006/main" mc:Ignorable="mv" mc:PreserveAttributes="mv:*">
   <p:cSld>
     <p:spTree>
@@ -20169,7 +16380,7 @@
 </p:sld>
 </file>
 
-<file path=ppt/slides/slide33.xml><?xml version="1.0" encoding="utf-8"?>
+<file path=ppt/slides/slide29.xml><?xml version="1.0" encoding="utf-8"?>
 <p:sld xmlns:a="http://schemas.openxmlformats.org/drawingml/2006/main" xmlns:r="http://schemas.openxmlformats.org/officeDocument/2006/relationships" xmlns:mc="http://schemas.openxmlformats.org/markup-compatibility/2006" xmlns:mv="urn:schemas-microsoft-com:mac:vml" xmlns:p="http://schemas.openxmlformats.org/presentationml/2006/main" mc:Ignorable="mv" mc:PreserveAttributes="mv:*">
   <p:cSld>
     <p:spTree>
@@ -20247,7 +16458,121 @@
 </p:sld>
 </file>
 
-<file path=ppt/slides/slide34.xml><?xml version="1.0" encoding="utf-8"?>
+<file path=ppt/slides/slide3.xml><?xml version="1.0" encoding="utf-8"?>
+<p:sld xmlns:a="http://schemas.openxmlformats.org/drawingml/2006/main" xmlns:r="http://schemas.openxmlformats.org/officeDocument/2006/relationships" xmlns:mc="http://schemas.openxmlformats.org/markup-compatibility/2006" xmlns:mv="urn:schemas-microsoft-com:mac:vml" xmlns:p="http://schemas.openxmlformats.org/presentationml/2006/main" mc:Ignorable="mv" mc:PreserveAttributes="mv:*">
+  <p:cSld>
+    <p:spTree>
+      <p:nvGrpSpPr>
+        <p:cNvPr id="1" name=""/>
+        <p:cNvGrpSpPr/>
+        <p:nvPr/>
+      </p:nvGrpSpPr>
+      <p:grpSpPr>
+        <a:xfrm>
+          <a:off x="0" y="0"/>
+          <a:ext cx="0" cy="0"/>
+          <a:chOff x="0" y="0"/>
+          <a:chExt cx="0" cy="0"/>
+        </a:xfrm>
+      </p:grpSpPr>
+      <p:sp>
+        <p:nvSpPr>
+          <p:cNvPr id="29698" name="Rectangle 2"/>
+          <p:cNvSpPr>
+            <a:spLocks noGrp="1" noChangeArrowheads="1"/>
+          </p:cNvSpPr>
+          <p:nvPr>
+            <p:ph type="body" idx="1"/>
+          </p:nvPr>
+        </p:nvSpPr>
+        <p:spPr>
+          <a:xfrm>
+            <a:off x="1315264" y="757249"/>
+            <a:ext cx="6518672" cy="4572000"/>
+          </a:xfrm>
+          <a:noFill/>
+          <a:ln w="76200">
+            <a:solidFill>
+              <a:srgbClr val="5293BF"/>
+            </a:solidFill>
+          </a:ln>
+          <a:effectLst>
+            <a:softEdge rad="292100"/>
+          </a:effectLst>
+        </p:spPr>
+        <p:txBody>
+          <a:bodyPr anchor="ctr"/>
+          <a:lstStyle/>
+          <a:p>
+            <a:pPr marL="0" algn="ctr" eaLnBrk="1" hangingPunct="1">
+              <a:buNone/>
+              <a:defRPr/>
+            </a:pPr>
+            <a:r>
+              <a:rPr lang="en-US" sz="3100" dirty="0" smtClean="0">
+                <a:latin typeface="Arial Rounded MT Bold" charset="0"/>
+              </a:rPr>
+              <a:t>Database access is</a:t>
+            </a:r>
+          </a:p>
+          <a:p>
+            <a:pPr marL="0" algn="ctr" eaLnBrk="1" hangingPunct="1">
+              <a:buNone/>
+              <a:defRPr/>
+            </a:pPr>
+            <a:r>
+              <a:rPr lang="en-US" sz="3100" dirty="0" smtClean="0">
+                <a:latin typeface="Arial Rounded MT Bold" charset="0"/>
+              </a:rPr>
+              <a:t>WAY   TOO   HARD</a:t>
+            </a:r>
+          </a:p>
+        </p:txBody>
+      </p:sp>
+      <p:sp>
+        <p:nvSpPr>
+          <p:cNvPr id="29701" name="Rectangle 1"/>
+          <p:cNvSpPr>
+            <a:spLocks noGrp="1" noChangeArrowheads="1"/>
+          </p:cNvSpPr>
+          <p:nvPr>
+            <p:ph type="title"/>
+          </p:nvPr>
+        </p:nvSpPr>
+        <p:spPr/>
+        <p:txBody>
+          <a:bodyPr/>
+          <a:lstStyle/>
+          <a:p>
+            <a:pPr eaLnBrk="1" hangingPunct="1"/>
+            <a:r>
+              <a:rPr lang="en-US" dirty="0" smtClean="0">
+                <a:latin typeface="Arial Rounded MT Bold" charset="0"/>
+              </a:rPr>
+              <a:t>The crux</a:t>
+            </a:r>
+          </a:p>
+        </p:txBody>
+      </p:sp>
+    </p:spTree>
+  </p:cSld>
+  <p:clrMapOvr>
+    <a:masterClrMapping/>
+  </p:clrMapOvr>
+  <p:transition>
+    <p:fade/>
+  </p:transition>
+  <p:timing>
+    <p:tnLst>
+      <p:par>
+        <p:cTn id="1" dur="indefinite" restart="never" nodeType="tmRoot"/>
+      </p:par>
+    </p:tnLst>
+  </p:timing>
+</p:sld>
+</file>
+
+<file path=ppt/slides/slide30.xml><?xml version="1.0" encoding="utf-8"?>
 <p:sld xmlns:a="http://schemas.openxmlformats.org/drawingml/2006/main" xmlns:r="http://schemas.openxmlformats.org/officeDocument/2006/relationships" xmlns:mc="http://schemas.openxmlformats.org/markup-compatibility/2006" xmlns:mv="urn:schemas-microsoft-com:mac:vml" xmlns:p="http://schemas.openxmlformats.org/presentationml/2006/main" mc:Ignorable="mv" mc:PreserveAttributes="mv:*">
   <p:cSld>
     <p:spTree>
@@ -20958,7 +17283,7 @@
 </p:sld>
 </file>
 
-<file path=ppt/slides/slide35.xml><?xml version="1.0" encoding="utf-8"?>
+<file path=ppt/slides/slide31.xml><?xml version="1.0" encoding="utf-8"?>
 <p:sld xmlns:a="http://schemas.openxmlformats.org/drawingml/2006/main" xmlns:r="http://schemas.openxmlformats.org/officeDocument/2006/relationships" xmlns:mc="http://schemas.openxmlformats.org/markup-compatibility/2006" xmlns:mv="urn:schemas-microsoft-com:mac:vml" xmlns:p="http://schemas.openxmlformats.org/presentationml/2006/main" mc:Ignorable="mv" mc:PreserveAttributes="mv:*">
   <p:cSld>
     <p:spTree>
@@ -22883,7 +19208,7 @@
 </p:sld>
 </file>
 
-<file path=ppt/slides/slide36.xml><?xml version="1.0" encoding="utf-8"?>
+<file path=ppt/slides/slide32.xml><?xml version="1.0" encoding="utf-8"?>
 <p:sld xmlns:a="http://schemas.openxmlformats.org/drawingml/2006/main" xmlns:r="http://schemas.openxmlformats.org/officeDocument/2006/relationships" xmlns:mc="http://schemas.openxmlformats.org/markup-compatibility/2006" xmlns:mv="urn:schemas-microsoft-com:mac:vml" xmlns:p="http://schemas.openxmlformats.org/presentationml/2006/main" mc:Ignorable="mv" mc:PreserveAttributes="mv:*">
   <p:cSld>
     <p:spTree>
@@ -23253,7 +19578,7 @@
 </p:sld>
 </file>
 
-<file path=ppt/slides/slide37.xml><?xml version="1.0" encoding="utf-8"?>
+<file path=ppt/slides/slide33.xml><?xml version="1.0" encoding="utf-8"?>
 <p:sld xmlns:a="http://schemas.openxmlformats.org/drawingml/2006/main" xmlns:r="http://schemas.openxmlformats.org/officeDocument/2006/relationships" xmlns:mc="http://schemas.openxmlformats.org/markup-compatibility/2006" xmlns:mv="urn:schemas-microsoft-com:mac:vml" xmlns:p="http://schemas.openxmlformats.org/presentationml/2006/main" mc:Ignorable="mv" mc:PreserveAttributes="mv:*">
   <p:cSld>
     <p:spTree>
@@ -23360,7 +19685,7 @@
 </p:sld>
 </file>
 
-<file path=ppt/slides/slide38.xml><?xml version="1.0" encoding="utf-8"?>
+<file path=ppt/slides/slide34.xml><?xml version="1.0" encoding="utf-8"?>
 <p:sld xmlns:a="http://schemas.openxmlformats.org/drawingml/2006/main" xmlns:r="http://schemas.openxmlformats.org/officeDocument/2006/relationships" xmlns:mc="http://schemas.openxmlformats.org/markup-compatibility/2006" xmlns:mv="urn:schemas-microsoft-com:mac:vml" xmlns:p="http://schemas.openxmlformats.org/presentationml/2006/main" mc:Ignorable="mv" mc:PreserveAttributes="mv:*">
   <p:cSld>
     <p:spTree>
@@ -23516,7 +19841,7 @@
               </a:stretch>
             </p:blipFill>
           </mc:Choice>
-          <mc:Fallback xmlns:p="http://schemas.openxmlformats.org/presentationml/2006/main" xmlns:mv="urn:schemas-microsoft-com:mac:vml" xmlns:mc="http://schemas.openxmlformats.org/markup-compatibility/2006" xmlns:r="http://schemas.openxmlformats.org/officeDocument/2006/relationships" xmlns:a="http://schemas.openxmlformats.org/drawingml/2006/main" xmlns="">
+          <mc:Fallback xmlns:ma="http://schemas.microsoft.com/office/mac/drawingml/2008/main" xmlns="" xmlns:a="http://schemas.openxmlformats.org/drawingml/2006/main" xmlns:r="http://schemas.openxmlformats.org/officeDocument/2006/relationships" xmlns:mc="http://schemas.openxmlformats.org/markup-compatibility/2006" xmlns:mv="urn:schemas-microsoft-com:mac:vml" xmlns:p="http://schemas.openxmlformats.org/presentationml/2006/main">
             <p:blipFill>
               <a:blip r:embed="rId4"/>
               <a:stretch>

</xml_diff>

<commit_message>
Removed leftovers of sql_database parameter, fixed thumbnail reference in the home page.
</commit_message>
<xml_diff>
--- a/docs/2010oscon/dbrelay_oscon2010.pptx
+++ b/docs/2010oscon/dbrelay_oscon2010.pptx
@@ -6852,8 +6852,8 @@
           </p:cNvPicPr>
           <p:nvPr/>
         </p:nvPicPr>
-        <mc:AlternateContent xmlns:ma="http://schemas.microsoft.com/office/mac/drawingml/2008/main">
-          <mc:Choice Requires="ma">
+        <mc:AlternateContent>
+          <mc:Choice xmlns:ma="http://schemas.microsoft.com/office/mac/drawingml/2008/main" Requires="ma">
             <p:blipFill>
               <a:blip r:embed="rId3"/>
               <a:stretch>
@@ -6861,7 +6861,7 @@
               </a:stretch>
             </p:blipFill>
           </mc:Choice>
-          <mc:Fallback xmlns:ma="http://schemas.microsoft.com/office/mac/drawingml/2008/main" xmlns="" xmlns:a="http://schemas.openxmlformats.org/drawingml/2006/main" xmlns:r="http://schemas.openxmlformats.org/officeDocument/2006/relationships" xmlns:mc="http://schemas.openxmlformats.org/markup-compatibility/2006" xmlns:mv="urn:schemas-microsoft-com:mac:vml" xmlns:p="http://schemas.openxmlformats.org/presentationml/2006/main">
+          <mc:Fallback>
             <p:blipFill>
               <a:blip r:embed="rId4"/>
               <a:stretch>
@@ -11251,7 +11251,7 @@
                 </a:solidFill>
                 <a:latin typeface="Inconsolata"/>
               </a:rPr>
-              <a:t>'sql'             : 'select count(*) as employees from HumanResources.vEmployee'</a:t>
+              <a:t>    'sql'             : 'select count(*) as employees from HumanResources.vEmployee'</a:t>
             </a:r>
           </a:p>
           <a:p>
@@ -19832,8 +19832,8 @@
           </p:cNvPicPr>
           <p:nvPr/>
         </p:nvPicPr>
-        <mc:AlternateContent xmlns:ma="http://schemas.microsoft.com/office/mac/drawingml/2008/main">
-          <mc:Choice Requires="ma">
+        <mc:AlternateContent>
+          <mc:Choice xmlns:ma="http://schemas.microsoft.com/office/mac/drawingml/2008/main" Requires="ma">
             <p:blipFill>
               <a:blip r:embed="rId3"/>
               <a:stretch>
@@ -19841,7 +19841,7 @@
               </a:stretch>
             </p:blipFill>
           </mc:Choice>
-          <mc:Fallback xmlns:ma="http://schemas.microsoft.com/office/mac/drawingml/2008/main" xmlns="" xmlns:a="http://schemas.openxmlformats.org/drawingml/2006/main" xmlns:r="http://schemas.openxmlformats.org/officeDocument/2006/relationships" xmlns:mc="http://schemas.openxmlformats.org/markup-compatibility/2006" xmlns:mv="urn:schemas-microsoft-com:mac:vml" xmlns:p="http://schemas.openxmlformats.org/presentationml/2006/main">
+          <mc:Fallback>
             <p:blipFill>
               <a:blip r:embed="rId4"/>
               <a:stretch>
@@ -20192,84 +20192,13 @@
               <a:rPr lang="en-US" sz="1400" noProof="1" smtClean="0">
                 <a:solidFill>
                   <a:schemeClr val="tx1">
-                    <a:lumMod val="85000"/>
-                    <a:lumOff val="15000"/>
-                  </a:schemeClr>
-                </a:solidFill>
-                <a:latin typeface="Inconsolata"/>
-              </a:rPr>
-              <a:t>  </a:t>
-            </a:r>
-            <a:r>
-              <a:rPr lang="en-US" sz="1400" noProof="1" smtClean="0">
-                <a:solidFill>
-                  <a:schemeClr val="tx1">
                     <a:lumMod val="50000"/>
                     <a:lumOff val="50000"/>
                   </a:schemeClr>
                 </a:solidFill>
                 <a:latin typeface="Inconsolata"/>
               </a:rPr>
-              <a:t>--data-urlencode </a:t>
-            </a:r>
-            <a:r>
-              <a:rPr lang="en-US" sz="1400" b="1" noProof="1" smtClean="0">
-                <a:solidFill>
-                  <a:srgbClr val="336699"/>
-                </a:solidFill>
-                <a:latin typeface="Inconsolata"/>
-              </a:rPr>
-              <a:t>sql_database=AdventureWorks </a:t>
-            </a:r>
-            <a:r>
-              <a:rPr lang="en-US" sz="1400" noProof="1" smtClean="0">
-                <a:solidFill>
-                  <a:schemeClr val="tx1">
-                    <a:lumMod val="85000"/>
-                    <a:lumOff val="15000"/>
-                  </a:schemeClr>
-                </a:solidFill>
-                <a:latin typeface="Inconsolata"/>
-              </a:rPr>
-              <a:t>\</a:t>
-            </a:r>
-          </a:p>
-          <a:p>
-            <a:pPr marL="0" indent="0">
-              <a:lnSpc>
-                <a:spcPct val="100000"/>
-              </a:lnSpc>
-              <a:spcBef>
-                <a:spcPct val="0"/>
-              </a:spcBef>
-              <a:spcAft>
-                <a:spcPct val="0"/>
-              </a:spcAft>
-              <a:buNone/>
-            </a:pPr>
-            <a:r>
-              <a:rPr lang="en-US" sz="1400" noProof="1" smtClean="0">
-                <a:solidFill>
-                  <a:schemeClr val="tx1">
-                    <a:lumMod val="85000"/>
-                    <a:lumOff val="15000"/>
-                  </a:schemeClr>
-                </a:solidFill>
-                <a:latin typeface="Inconsolata"/>
-              </a:rPr>
-              <a:t>  </a:t>
-            </a:r>
-            <a:r>
-              <a:rPr lang="en-US" sz="1400" noProof="1" smtClean="0">
-                <a:solidFill>
-                  <a:schemeClr val="tx1">
-                    <a:lumMod val="50000"/>
-                    <a:lumOff val="50000"/>
-                  </a:schemeClr>
-                </a:solidFill>
-                <a:latin typeface="Inconsolata"/>
-              </a:rPr>
-              <a:t>--data-urlencode </a:t>
+              <a:t>  --data-urlencode </a:t>
             </a:r>
             <a:r>
               <a:rPr lang="en-US" sz="1400" b="1" noProof="1" smtClean="0">

</xml_diff>

<commit_message>
Replaced privare git URL with the correct public one.
</commit_message>
<xml_diff>
--- a/docs/2010oscon/dbrelay_oscon2010.pptx
+++ b/docs/2010oscon/dbrelay_oscon2010.pptx
@@ -13249,8 +13249,8 @@
         </p:nvSpPr>
         <p:spPr bwMode="auto">
           <a:xfrm>
-            <a:off x="1752601" y="1981200"/>
-            <a:ext cx="7027514" cy="3047999"/>
+            <a:off x="1752600" y="1981200"/>
+            <a:ext cx="7162799" cy="3047999"/>
           </a:xfrm>
           <a:prstGeom prst="rect">
             <a:avLst/>
@@ -13341,7 +13341,7 @@
             </a:r>
           </a:p>
           <a:p>
-            <a:pPr marR="0" lvl="0" algn="l" defTabSz="914400" rtl="0" eaLnBrk="0" fontAlgn="base" latinLnBrk="0" hangingPunct="0">
+            <a:pPr lvl="0" eaLnBrk="0" hangingPunct="0">
               <a:spcBef>
                 <a:spcPts val="0"/>
               </a:spcBef>
@@ -13352,9 +13352,6 @@
                 <a:schemeClr val="accent6"/>
               </a:buClr>
               <a:buSzPct val="100000"/>
-              <a:buFont typeface="Wingdings" charset="2"/>
-              <a:buNone/>
-              <a:tabLst/>
               <a:defRPr/>
             </a:pPr>
             <a:r>
@@ -13367,7 +13364,31 @@
                 <a:cs typeface="+mn-cs"/>
                 <a:sym typeface="Arial" charset="0"/>
               </a:rPr>
-              <a:t>$ git clone git@github.com:dbrelay/dbrelay.git git</a:t>
+              <a:t>$ git clone</a:t>
+            </a:r>
+            <a:r>
+              <a:rPr lang="en-US" sz="2000" kern="0" noProof="1" smtClean="0">
+                <a:solidFill>
+                  <a:schemeClr val="bg1"/>
+                </a:solidFill>
+                <a:latin typeface="Inconsolata"/>
+                <a:ea typeface="+mn-ea"/>
+                <a:cs typeface="+mn-cs"/>
+                <a:sym typeface="Arial" charset="0"/>
+              </a:rPr>
+              <a:t> http://github.com/dbrelay/dbrelay.git </a:t>
+            </a:r>
+            <a:r>
+              <a:rPr lang="en-US" sz="2000" kern="0" noProof="1" smtClean="0">
+                <a:solidFill>
+                  <a:schemeClr val="bg1"/>
+                </a:solidFill>
+                <a:latin typeface="Inconsolata"/>
+                <a:ea typeface="+mn-ea"/>
+                <a:cs typeface="+mn-cs"/>
+                <a:sym typeface="Arial" charset="0"/>
+              </a:rPr>
+              <a:t>git</a:t>
             </a:r>
           </a:p>
           <a:p>

</xml_diff>